<commit_message>
Kezdetleges dia animációk, elköszönődia
</commit_message>
<xml_diff>
--- a/Prezentáció.pptx
+++ b/Prezentáció.pptx
@@ -9,10 +9,10 @@
   </p:notesMasterIdLst>
   <p:sldIdLst>
     <p:sldId id="261" r:id="rId2"/>
-    <p:sldId id="263" r:id="rId3"/>
+    <p:sldId id="266" r:id="rId3"/>
     <p:sldId id="265" r:id="rId4"/>
-    <p:sldId id="266" r:id="rId5"/>
-    <p:sldId id="264" r:id="rId6"/>
+    <p:sldId id="264" r:id="rId5"/>
+    <p:sldId id="267" r:id="rId6"/>
   </p:sldIdLst>
   <p:sldSz cx="12192000" cy="6858000"/>
   <p:notesSz cx="6858000" cy="9144000"/>
@@ -216,7 +216,7 @@
           <a:p>
             <a:fld id="{045CADAF-2C59-4E58-A455-8868FC9726FC}" type="datetimeFigureOut">
               <a:rPr lang="hu-HU" smtClean="0"/>
-              <a:t>2024. 01. 24.</a:t>
+              <a:t>2024. 01. 25.</a:t>
             </a:fld>
             <a:endParaRPr lang="hu-HU"/>
           </a:p>
@@ -505,7 +505,7 @@
           <p:cNvPr id="2" name="Cím 1">
             <a:extLst>
               <a:ext uri="{FF2B5EF4-FFF2-40B4-BE49-F238E27FC236}">
-                <a16:creationId xmlns:a16="http://schemas.microsoft.com/office/drawing/2014/main" id="{79B6456A-B89F-DB5E-FE02-0F1DA12AD99C}"/>
+                <a16:creationId xmlns:a16="http://schemas.microsoft.com/office/drawing/2014/main" xmlns="" id="{79B6456A-B89F-DB5E-FE02-0F1DA12AD99C}"/>
               </a:ext>
             </a:extLst>
           </p:cNvPr>
@@ -542,7 +542,7 @@
           <p:cNvPr id="3" name="Alcím 2">
             <a:extLst>
               <a:ext uri="{FF2B5EF4-FFF2-40B4-BE49-F238E27FC236}">
-                <a16:creationId xmlns:a16="http://schemas.microsoft.com/office/drawing/2014/main" id="{A6DE1E2A-F8A7-5B84-A151-03A46EFC33A0}"/>
+                <a16:creationId xmlns:a16="http://schemas.microsoft.com/office/drawing/2014/main" xmlns="" id="{A6DE1E2A-F8A7-5B84-A151-03A46EFC33A0}"/>
               </a:ext>
             </a:extLst>
           </p:cNvPr>
@@ -612,7 +612,7 @@
           <p:cNvPr id="4" name="Dátum helye 3">
             <a:extLst>
               <a:ext uri="{FF2B5EF4-FFF2-40B4-BE49-F238E27FC236}">
-                <a16:creationId xmlns:a16="http://schemas.microsoft.com/office/drawing/2014/main" id="{F980237B-C6D6-EEEC-6B52-84C67949BF3B}"/>
+                <a16:creationId xmlns:a16="http://schemas.microsoft.com/office/drawing/2014/main" xmlns="" id="{F980237B-C6D6-EEEC-6B52-84C67949BF3B}"/>
               </a:ext>
             </a:extLst>
           </p:cNvPr>
@@ -630,7 +630,7 @@
           <a:p>
             <a:fld id="{8E532DDB-289F-42C2-8F57-09A656E29423}" type="datetimeFigureOut">
               <a:rPr lang="hu-HU" smtClean="0"/>
-              <a:t>2024. 01. 24.</a:t>
+              <a:t>2024. 01. 25.</a:t>
             </a:fld>
             <a:endParaRPr lang="hu-HU"/>
           </a:p>
@@ -641,7 +641,7 @@
           <p:cNvPr id="5" name="Élőláb helye 4">
             <a:extLst>
               <a:ext uri="{FF2B5EF4-FFF2-40B4-BE49-F238E27FC236}">
-                <a16:creationId xmlns:a16="http://schemas.microsoft.com/office/drawing/2014/main" id="{28C59F81-E057-3434-B32E-2F293C18052C}"/>
+                <a16:creationId xmlns:a16="http://schemas.microsoft.com/office/drawing/2014/main" xmlns="" id="{28C59F81-E057-3434-B32E-2F293C18052C}"/>
               </a:ext>
             </a:extLst>
           </p:cNvPr>
@@ -666,7 +666,7 @@
           <p:cNvPr id="6" name="Dia számának helye 5">
             <a:extLst>
               <a:ext uri="{FF2B5EF4-FFF2-40B4-BE49-F238E27FC236}">
-                <a16:creationId xmlns:a16="http://schemas.microsoft.com/office/drawing/2014/main" id="{C1AF783E-2A3F-DDD6-8CA2-C976E1B0C6A1}"/>
+                <a16:creationId xmlns:a16="http://schemas.microsoft.com/office/drawing/2014/main" xmlns="" id="{C1AF783E-2A3F-DDD6-8CA2-C976E1B0C6A1}"/>
               </a:ext>
             </a:extLst>
           </p:cNvPr>
@@ -725,7 +725,7 @@
           <p:cNvPr id="2" name="Cím 1">
             <a:extLst>
               <a:ext uri="{FF2B5EF4-FFF2-40B4-BE49-F238E27FC236}">
-                <a16:creationId xmlns:a16="http://schemas.microsoft.com/office/drawing/2014/main" id="{DDA30CDC-3A8E-3316-F1FC-A9220E50C37B}"/>
+                <a16:creationId xmlns:a16="http://schemas.microsoft.com/office/drawing/2014/main" xmlns="" id="{DDA30CDC-3A8E-3316-F1FC-A9220E50C37B}"/>
               </a:ext>
             </a:extLst>
           </p:cNvPr>
@@ -753,7 +753,7 @@
           <p:cNvPr id="3" name="Függőleges szöveg helye 2">
             <a:extLst>
               <a:ext uri="{FF2B5EF4-FFF2-40B4-BE49-F238E27FC236}">
-                <a16:creationId xmlns:a16="http://schemas.microsoft.com/office/drawing/2014/main" id="{83D8B0E5-C35F-E4C0-6AC3-2B5A64F7A76F}"/>
+                <a16:creationId xmlns:a16="http://schemas.microsoft.com/office/drawing/2014/main" xmlns="" id="{83D8B0E5-C35F-E4C0-6AC3-2B5A64F7A76F}"/>
               </a:ext>
             </a:extLst>
           </p:cNvPr>
@@ -810,7 +810,7 @@
           <p:cNvPr id="4" name="Dátum helye 3">
             <a:extLst>
               <a:ext uri="{FF2B5EF4-FFF2-40B4-BE49-F238E27FC236}">
-                <a16:creationId xmlns:a16="http://schemas.microsoft.com/office/drawing/2014/main" id="{27E917AB-2C23-72BC-58BD-AD4F821B36F8}"/>
+                <a16:creationId xmlns:a16="http://schemas.microsoft.com/office/drawing/2014/main" xmlns="" id="{27E917AB-2C23-72BC-58BD-AD4F821B36F8}"/>
               </a:ext>
             </a:extLst>
           </p:cNvPr>
@@ -828,7 +828,7 @@
           <a:p>
             <a:fld id="{8E532DDB-289F-42C2-8F57-09A656E29423}" type="datetimeFigureOut">
               <a:rPr lang="hu-HU" smtClean="0"/>
-              <a:t>2024. 01. 24.</a:t>
+              <a:t>2024. 01. 25.</a:t>
             </a:fld>
             <a:endParaRPr lang="hu-HU"/>
           </a:p>
@@ -839,7 +839,7 @@
           <p:cNvPr id="5" name="Élőláb helye 4">
             <a:extLst>
               <a:ext uri="{FF2B5EF4-FFF2-40B4-BE49-F238E27FC236}">
-                <a16:creationId xmlns:a16="http://schemas.microsoft.com/office/drawing/2014/main" id="{4B6D012D-1C6A-411E-6219-2F45E5523C6B}"/>
+                <a16:creationId xmlns:a16="http://schemas.microsoft.com/office/drawing/2014/main" xmlns="" id="{4B6D012D-1C6A-411E-6219-2F45E5523C6B}"/>
               </a:ext>
             </a:extLst>
           </p:cNvPr>
@@ -864,7 +864,7 @@
           <p:cNvPr id="6" name="Dia számának helye 5">
             <a:extLst>
               <a:ext uri="{FF2B5EF4-FFF2-40B4-BE49-F238E27FC236}">
-                <a16:creationId xmlns:a16="http://schemas.microsoft.com/office/drawing/2014/main" id="{5F592276-49E8-0983-AC04-5D66492B2658}"/>
+                <a16:creationId xmlns:a16="http://schemas.microsoft.com/office/drawing/2014/main" xmlns="" id="{5F592276-49E8-0983-AC04-5D66492B2658}"/>
               </a:ext>
             </a:extLst>
           </p:cNvPr>
@@ -923,7 +923,7 @@
           <p:cNvPr id="2" name="Függőleges cím 1">
             <a:extLst>
               <a:ext uri="{FF2B5EF4-FFF2-40B4-BE49-F238E27FC236}">
-                <a16:creationId xmlns:a16="http://schemas.microsoft.com/office/drawing/2014/main" id="{A6B2959D-F0DB-7505-3887-5F0F8A4ED834}"/>
+                <a16:creationId xmlns:a16="http://schemas.microsoft.com/office/drawing/2014/main" xmlns="" id="{A6B2959D-F0DB-7505-3887-5F0F8A4ED834}"/>
               </a:ext>
             </a:extLst>
           </p:cNvPr>
@@ -956,7 +956,7 @@
           <p:cNvPr id="3" name="Függőleges szöveg helye 2">
             <a:extLst>
               <a:ext uri="{FF2B5EF4-FFF2-40B4-BE49-F238E27FC236}">
-                <a16:creationId xmlns:a16="http://schemas.microsoft.com/office/drawing/2014/main" id="{20E0E6C5-085C-D09C-084F-C460729F9E6D}"/>
+                <a16:creationId xmlns:a16="http://schemas.microsoft.com/office/drawing/2014/main" xmlns="" id="{20E0E6C5-085C-D09C-084F-C460729F9E6D}"/>
               </a:ext>
             </a:extLst>
           </p:cNvPr>
@@ -1018,7 +1018,7 @@
           <p:cNvPr id="4" name="Dátum helye 3">
             <a:extLst>
               <a:ext uri="{FF2B5EF4-FFF2-40B4-BE49-F238E27FC236}">
-                <a16:creationId xmlns:a16="http://schemas.microsoft.com/office/drawing/2014/main" id="{DFF17BF3-0335-8A93-5A46-EC3F20E0ADE1}"/>
+                <a16:creationId xmlns:a16="http://schemas.microsoft.com/office/drawing/2014/main" xmlns="" id="{DFF17BF3-0335-8A93-5A46-EC3F20E0ADE1}"/>
               </a:ext>
             </a:extLst>
           </p:cNvPr>
@@ -1036,7 +1036,7 @@
           <a:p>
             <a:fld id="{8E532DDB-289F-42C2-8F57-09A656E29423}" type="datetimeFigureOut">
               <a:rPr lang="hu-HU" smtClean="0"/>
-              <a:t>2024. 01. 24.</a:t>
+              <a:t>2024. 01. 25.</a:t>
             </a:fld>
             <a:endParaRPr lang="hu-HU"/>
           </a:p>
@@ -1047,7 +1047,7 @@
           <p:cNvPr id="5" name="Élőláb helye 4">
             <a:extLst>
               <a:ext uri="{FF2B5EF4-FFF2-40B4-BE49-F238E27FC236}">
-                <a16:creationId xmlns:a16="http://schemas.microsoft.com/office/drawing/2014/main" id="{3AFF700C-B4A6-FF55-FA3A-937997218C71}"/>
+                <a16:creationId xmlns:a16="http://schemas.microsoft.com/office/drawing/2014/main" xmlns="" id="{3AFF700C-B4A6-FF55-FA3A-937997218C71}"/>
               </a:ext>
             </a:extLst>
           </p:cNvPr>
@@ -1072,7 +1072,7 @@
           <p:cNvPr id="6" name="Dia számának helye 5">
             <a:extLst>
               <a:ext uri="{FF2B5EF4-FFF2-40B4-BE49-F238E27FC236}">
-                <a16:creationId xmlns:a16="http://schemas.microsoft.com/office/drawing/2014/main" id="{B456B9AE-E4C3-00FA-5622-26ECD962BC14}"/>
+                <a16:creationId xmlns:a16="http://schemas.microsoft.com/office/drawing/2014/main" xmlns="" id="{B456B9AE-E4C3-00FA-5622-26ECD962BC14}"/>
               </a:ext>
             </a:extLst>
           </p:cNvPr>
@@ -1131,7 +1131,7 @@
           <p:cNvPr id="2" name="Cím 1">
             <a:extLst>
               <a:ext uri="{FF2B5EF4-FFF2-40B4-BE49-F238E27FC236}">
-                <a16:creationId xmlns:a16="http://schemas.microsoft.com/office/drawing/2014/main" id="{8F09B032-43DE-EB55-9460-DDEBB15DC2E7}"/>
+                <a16:creationId xmlns:a16="http://schemas.microsoft.com/office/drawing/2014/main" xmlns="" id="{8F09B032-43DE-EB55-9460-DDEBB15DC2E7}"/>
               </a:ext>
             </a:extLst>
           </p:cNvPr>
@@ -1159,7 +1159,7 @@
           <p:cNvPr id="3" name="Tartalom helye 2">
             <a:extLst>
               <a:ext uri="{FF2B5EF4-FFF2-40B4-BE49-F238E27FC236}">
-                <a16:creationId xmlns:a16="http://schemas.microsoft.com/office/drawing/2014/main" id="{93761993-65DF-B03B-15A1-DAAA88CF63C3}"/>
+                <a16:creationId xmlns:a16="http://schemas.microsoft.com/office/drawing/2014/main" xmlns="" id="{93761993-65DF-B03B-15A1-DAAA88CF63C3}"/>
               </a:ext>
             </a:extLst>
           </p:cNvPr>
@@ -1216,7 +1216,7 @@
           <p:cNvPr id="4" name="Dátum helye 3">
             <a:extLst>
               <a:ext uri="{FF2B5EF4-FFF2-40B4-BE49-F238E27FC236}">
-                <a16:creationId xmlns:a16="http://schemas.microsoft.com/office/drawing/2014/main" id="{EC19022C-9411-F196-94CA-7EB83954162C}"/>
+                <a16:creationId xmlns:a16="http://schemas.microsoft.com/office/drawing/2014/main" xmlns="" id="{EC19022C-9411-F196-94CA-7EB83954162C}"/>
               </a:ext>
             </a:extLst>
           </p:cNvPr>
@@ -1234,7 +1234,7 @@
           <a:p>
             <a:fld id="{8E532DDB-289F-42C2-8F57-09A656E29423}" type="datetimeFigureOut">
               <a:rPr lang="hu-HU" smtClean="0"/>
-              <a:t>2024. 01. 24.</a:t>
+              <a:t>2024. 01. 25.</a:t>
             </a:fld>
             <a:endParaRPr lang="hu-HU"/>
           </a:p>
@@ -1245,7 +1245,7 @@
           <p:cNvPr id="5" name="Élőláb helye 4">
             <a:extLst>
               <a:ext uri="{FF2B5EF4-FFF2-40B4-BE49-F238E27FC236}">
-                <a16:creationId xmlns:a16="http://schemas.microsoft.com/office/drawing/2014/main" id="{D92C1323-42F5-817C-23A6-5BD482993B91}"/>
+                <a16:creationId xmlns:a16="http://schemas.microsoft.com/office/drawing/2014/main" xmlns="" id="{D92C1323-42F5-817C-23A6-5BD482993B91}"/>
               </a:ext>
             </a:extLst>
           </p:cNvPr>
@@ -1270,7 +1270,7 @@
           <p:cNvPr id="6" name="Dia számának helye 5">
             <a:extLst>
               <a:ext uri="{FF2B5EF4-FFF2-40B4-BE49-F238E27FC236}">
-                <a16:creationId xmlns:a16="http://schemas.microsoft.com/office/drawing/2014/main" id="{7AAADE6D-0E59-9965-FCC6-DEC79020261D}"/>
+                <a16:creationId xmlns:a16="http://schemas.microsoft.com/office/drawing/2014/main" xmlns="" id="{7AAADE6D-0E59-9965-FCC6-DEC79020261D}"/>
               </a:ext>
             </a:extLst>
           </p:cNvPr>
@@ -1329,7 +1329,7 @@
           <p:cNvPr id="2" name="Cím 1">
             <a:extLst>
               <a:ext uri="{FF2B5EF4-FFF2-40B4-BE49-F238E27FC236}">
-                <a16:creationId xmlns:a16="http://schemas.microsoft.com/office/drawing/2014/main" id="{7A4FD609-97C6-FDCF-196C-C04CE372C3DE}"/>
+                <a16:creationId xmlns:a16="http://schemas.microsoft.com/office/drawing/2014/main" xmlns="" id="{7A4FD609-97C6-FDCF-196C-C04CE372C3DE}"/>
               </a:ext>
             </a:extLst>
           </p:cNvPr>
@@ -1366,7 +1366,7 @@
           <p:cNvPr id="3" name="Szöveg helye 2">
             <a:extLst>
               <a:ext uri="{FF2B5EF4-FFF2-40B4-BE49-F238E27FC236}">
-                <a16:creationId xmlns:a16="http://schemas.microsoft.com/office/drawing/2014/main" id="{5FF2CCF6-3BEC-B1BD-A408-1E0E439D4494}"/>
+                <a16:creationId xmlns:a16="http://schemas.microsoft.com/office/drawing/2014/main" xmlns="" id="{5FF2CCF6-3BEC-B1BD-A408-1E0E439D4494}"/>
               </a:ext>
             </a:extLst>
           </p:cNvPr>
@@ -1491,7 +1491,7 @@
           <p:cNvPr id="4" name="Dátum helye 3">
             <a:extLst>
               <a:ext uri="{FF2B5EF4-FFF2-40B4-BE49-F238E27FC236}">
-                <a16:creationId xmlns:a16="http://schemas.microsoft.com/office/drawing/2014/main" id="{02D96E93-B7FD-52C4-1976-571A32AA135C}"/>
+                <a16:creationId xmlns:a16="http://schemas.microsoft.com/office/drawing/2014/main" xmlns="" id="{02D96E93-B7FD-52C4-1976-571A32AA135C}"/>
               </a:ext>
             </a:extLst>
           </p:cNvPr>
@@ -1509,7 +1509,7 @@
           <a:p>
             <a:fld id="{8E532DDB-289F-42C2-8F57-09A656E29423}" type="datetimeFigureOut">
               <a:rPr lang="hu-HU" smtClean="0"/>
-              <a:t>2024. 01. 24.</a:t>
+              <a:t>2024. 01. 25.</a:t>
             </a:fld>
             <a:endParaRPr lang="hu-HU"/>
           </a:p>
@@ -1520,7 +1520,7 @@
           <p:cNvPr id="5" name="Élőláb helye 4">
             <a:extLst>
               <a:ext uri="{FF2B5EF4-FFF2-40B4-BE49-F238E27FC236}">
-                <a16:creationId xmlns:a16="http://schemas.microsoft.com/office/drawing/2014/main" id="{427CAFE0-46BC-55A4-87F5-A8059EC7A0F7}"/>
+                <a16:creationId xmlns:a16="http://schemas.microsoft.com/office/drawing/2014/main" xmlns="" id="{427CAFE0-46BC-55A4-87F5-A8059EC7A0F7}"/>
               </a:ext>
             </a:extLst>
           </p:cNvPr>
@@ -1545,7 +1545,7 @@
           <p:cNvPr id="6" name="Dia számának helye 5">
             <a:extLst>
               <a:ext uri="{FF2B5EF4-FFF2-40B4-BE49-F238E27FC236}">
-                <a16:creationId xmlns:a16="http://schemas.microsoft.com/office/drawing/2014/main" id="{CC3EFF7C-F069-DFE5-3306-0E561AF4AE11}"/>
+                <a16:creationId xmlns:a16="http://schemas.microsoft.com/office/drawing/2014/main" xmlns="" id="{CC3EFF7C-F069-DFE5-3306-0E561AF4AE11}"/>
               </a:ext>
             </a:extLst>
           </p:cNvPr>
@@ -1604,7 +1604,7 @@
           <p:cNvPr id="2" name="Cím 1">
             <a:extLst>
               <a:ext uri="{FF2B5EF4-FFF2-40B4-BE49-F238E27FC236}">
-                <a16:creationId xmlns:a16="http://schemas.microsoft.com/office/drawing/2014/main" id="{DD16BD1C-A96C-C433-11C4-7FB2F9CF4217}"/>
+                <a16:creationId xmlns:a16="http://schemas.microsoft.com/office/drawing/2014/main" xmlns="" id="{DD16BD1C-A96C-C433-11C4-7FB2F9CF4217}"/>
               </a:ext>
             </a:extLst>
           </p:cNvPr>
@@ -1632,7 +1632,7 @@
           <p:cNvPr id="3" name="Tartalom helye 2">
             <a:extLst>
               <a:ext uri="{FF2B5EF4-FFF2-40B4-BE49-F238E27FC236}">
-                <a16:creationId xmlns:a16="http://schemas.microsoft.com/office/drawing/2014/main" id="{216662B5-E8AA-B1E7-B29B-CC9EA1747EB8}"/>
+                <a16:creationId xmlns:a16="http://schemas.microsoft.com/office/drawing/2014/main" xmlns="" id="{216662B5-E8AA-B1E7-B29B-CC9EA1747EB8}"/>
               </a:ext>
             </a:extLst>
           </p:cNvPr>
@@ -1694,7 +1694,7 @@
           <p:cNvPr id="4" name="Tartalom helye 3">
             <a:extLst>
               <a:ext uri="{FF2B5EF4-FFF2-40B4-BE49-F238E27FC236}">
-                <a16:creationId xmlns:a16="http://schemas.microsoft.com/office/drawing/2014/main" id="{F91EB719-6D94-619D-DA44-432529F07A64}"/>
+                <a16:creationId xmlns:a16="http://schemas.microsoft.com/office/drawing/2014/main" xmlns="" id="{F91EB719-6D94-619D-DA44-432529F07A64}"/>
               </a:ext>
             </a:extLst>
           </p:cNvPr>
@@ -1756,7 +1756,7 @@
           <p:cNvPr id="5" name="Dátum helye 4">
             <a:extLst>
               <a:ext uri="{FF2B5EF4-FFF2-40B4-BE49-F238E27FC236}">
-                <a16:creationId xmlns:a16="http://schemas.microsoft.com/office/drawing/2014/main" id="{F719282D-DF51-71E0-FA65-579C7251FFED}"/>
+                <a16:creationId xmlns:a16="http://schemas.microsoft.com/office/drawing/2014/main" xmlns="" id="{F719282D-DF51-71E0-FA65-579C7251FFED}"/>
               </a:ext>
             </a:extLst>
           </p:cNvPr>
@@ -1774,7 +1774,7 @@
           <a:p>
             <a:fld id="{8E532DDB-289F-42C2-8F57-09A656E29423}" type="datetimeFigureOut">
               <a:rPr lang="hu-HU" smtClean="0"/>
-              <a:t>2024. 01. 24.</a:t>
+              <a:t>2024. 01. 25.</a:t>
             </a:fld>
             <a:endParaRPr lang="hu-HU"/>
           </a:p>
@@ -1785,7 +1785,7 @@
           <p:cNvPr id="6" name="Élőláb helye 5">
             <a:extLst>
               <a:ext uri="{FF2B5EF4-FFF2-40B4-BE49-F238E27FC236}">
-                <a16:creationId xmlns:a16="http://schemas.microsoft.com/office/drawing/2014/main" id="{9CA010A5-65CA-F06E-E671-C1073A8C6DFA}"/>
+                <a16:creationId xmlns:a16="http://schemas.microsoft.com/office/drawing/2014/main" xmlns="" id="{9CA010A5-65CA-F06E-E671-C1073A8C6DFA}"/>
               </a:ext>
             </a:extLst>
           </p:cNvPr>
@@ -1810,7 +1810,7 @@
           <p:cNvPr id="7" name="Dia számának helye 6">
             <a:extLst>
               <a:ext uri="{FF2B5EF4-FFF2-40B4-BE49-F238E27FC236}">
-                <a16:creationId xmlns:a16="http://schemas.microsoft.com/office/drawing/2014/main" id="{16635656-463D-7407-9573-D0E1E69DA9BA}"/>
+                <a16:creationId xmlns:a16="http://schemas.microsoft.com/office/drawing/2014/main" xmlns="" id="{16635656-463D-7407-9573-D0E1E69DA9BA}"/>
               </a:ext>
             </a:extLst>
           </p:cNvPr>
@@ -1877,7 +1877,7 @@
           <p:cNvPr id="10" name="Téglalap: lekerekített 9">
             <a:extLst>
               <a:ext uri="{FF2B5EF4-FFF2-40B4-BE49-F238E27FC236}">
-                <a16:creationId xmlns:a16="http://schemas.microsoft.com/office/drawing/2014/main" id="{5C929177-02C2-6B75-4903-1A897B6B857B}"/>
+                <a16:creationId xmlns:a16="http://schemas.microsoft.com/office/drawing/2014/main" xmlns="" id="{5C929177-02C2-6B75-4903-1A897B6B857B}"/>
               </a:ext>
             </a:extLst>
           </p:cNvPr>
@@ -1934,7 +1934,7 @@
           <p:cNvPr id="12" name="Téglalap: lekerekített 11">
             <a:extLst>
               <a:ext uri="{FF2B5EF4-FFF2-40B4-BE49-F238E27FC236}">
-                <a16:creationId xmlns:a16="http://schemas.microsoft.com/office/drawing/2014/main" id="{4263DA3D-3720-84C8-46EF-56A35EEE76D5}"/>
+                <a16:creationId xmlns:a16="http://schemas.microsoft.com/office/drawing/2014/main" xmlns="" id="{4263DA3D-3720-84C8-46EF-56A35EEE76D5}"/>
               </a:ext>
             </a:extLst>
           </p:cNvPr>
@@ -2020,7 +2020,7 @@
           <p:cNvPr id="2" name="Cím 1">
             <a:extLst>
               <a:ext uri="{FF2B5EF4-FFF2-40B4-BE49-F238E27FC236}">
-                <a16:creationId xmlns:a16="http://schemas.microsoft.com/office/drawing/2014/main" id="{9BB4D70D-713A-8887-D67D-44EF31009DDB}"/>
+                <a16:creationId xmlns:a16="http://schemas.microsoft.com/office/drawing/2014/main" xmlns="" id="{9BB4D70D-713A-8887-D67D-44EF31009DDB}"/>
               </a:ext>
             </a:extLst>
           </p:cNvPr>
@@ -2048,7 +2048,7 @@
           <p:cNvPr id="3" name="Dátum helye 2">
             <a:extLst>
               <a:ext uri="{FF2B5EF4-FFF2-40B4-BE49-F238E27FC236}">
-                <a16:creationId xmlns:a16="http://schemas.microsoft.com/office/drawing/2014/main" id="{38F97F01-6921-2071-E7CF-B953B6A631B9}"/>
+                <a16:creationId xmlns:a16="http://schemas.microsoft.com/office/drawing/2014/main" xmlns="" id="{38F97F01-6921-2071-E7CF-B953B6A631B9}"/>
               </a:ext>
             </a:extLst>
           </p:cNvPr>
@@ -2066,7 +2066,7 @@
           <a:p>
             <a:fld id="{8E532DDB-289F-42C2-8F57-09A656E29423}" type="datetimeFigureOut">
               <a:rPr lang="hu-HU" smtClean="0"/>
-              <a:t>2024. 01. 24.</a:t>
+              <a:t>2024. 01. 25.</a:t>
             </a:fld>
             <a:endParaRPr lang="hu-HU"/>
           </a:p>
@@ -2077,7 +2077,7 @@
           <p:cNvPr id="4" name="Élőláb helye 3">
             <a:extLst>
               <a:ext uri="{FF2B5EF4-FFF2-40B4-BE49-F238E27FC236}">
-                <a16:creationId xmlns:a16="http://schemas.microsoft.com/office/drawing/2014/main" id="{792745E5-843C-C4BC-0A40-C73AF021DF1B}"/>
+                <a16:creationId xmlns:a16="http://schemas.microsoft.com/office/drawing/2014/main" xmlns="" id="{792745E5-843C-C4BC-0A40-C73AF021DF1B}"/>
               </a:ext>
             </a:extLst>
           </p:cNvPr>
@@ -2102,7 +2102,7 @@
           <p:cNvPr id="5" name="Dia számának helye 4">
             <a:extLst>
               <a:ext uri="{FF2B5EF4-FFF2-40B4-BE49-F238E27FC236}">
-                <a16:creationId xmlns:a16="http://schemas.microsoft.com/office/drawing/2014/main" id="{368A0A24-A47E-950C-021B-05FD744DD010}"/>
+                <a16:creationId xmlns:a16="http://schemas.microsoft.com/office/drawing/2014/main" xmlns="" id="{368A0A24-A47E-950C-021B-05FD744DD010}"/>
               </a:ext>
             </a:extLst>
           </p:cNvPr>
@@ -2169,7 +2169,7 @@
           <p:cNvPr id="5" name="Ellipszis 4">
             <a:extLst>
               <a:ext uri="{FF2B5EF4-FFF2-40B4-BE49-F238E27FC236}">
-                <a16:creationId xmlns:a16="http://schemas.microsoft.com/office/drawing/2014/main" id="{A0BDDF6C-542F-81C9-9F4B-8813C7292558}"/>
+                <a16:creationId xmlns:a16="http://schemas.microsoft.com/office/drawing/2014/main" xmlns="" id="{A0BDDF6C-542F-81C9-9F4B-8813C7292558}"/>
               </a:ext>
             </a:extLst>
           </p:cNvPr>
@@ -2228,7 +2228,7 @@
           <p:cNvPr id="6" name="Ellipszis 5">
             <a:extLst>
               <a:ext uri="{FF2B5EF4-FFF2-40B4-BE49-F238E27FC236}">
-                <a16:creationId xmlns:a16="http://schemas.microsoft.com/office/drawing/2014/main" id="{9D7F498D-E1BA-D32F-5381-088641790353}"/>
+                <a16:creationId xmlns:a16="http://schemas.microsoft.com/office/drawing/2014/main" xmlns="" id="{9D7F498D-E1BA-D32F-5381-088641790353}"/>
               </a:ext>
             </a:extLst>
           </p:cNvPr>
@@ -2314,7 +2314,7 @@
           <p:cNvPr id="2" name="Cím 1">
             <a:extLst>
               <a:ext uri="{FF2B5EF4-FFF2-40B4-BE49-F238E27FC236}">
-                <a16:creationId xmlns:a16="http://schemas.microsoft.com/office/drawing/2014/main" id="{4BA820B7-A734-61BA-025C-8A1D6FB9D823}"/>
+                <a16:creationId xmlns:a16="http://schemas.microsoft.com/office/drawing/2014/main" xmlns="" id="{4BA820B7-A734-61BA-025C-8A1D6FB9D823}"/>
               </a:ext>
             </a:extLst>
           </p:cNvPr>
@@ -2351,7 +2351,7 @@
           <p:cNvPr id="3" name="Tartalom helye 2">
             <a:extLst>
               <a:ext uri="{FF2B5EF4-FFF2-40B4-BE49-F238E27FC236}">
-                <a16:creationId xmlns:a16="http://schemas.microsoft.com/office/drawing/2014/main" id="{D85A7804-99D9-2553-C6EE-AE084D6A85BE}"/>
+                <a16:creationId xmlns:a16="http://schemas.microsoft.com/office/drawing/2014/main" xmlns="" id="{D85A7804-99D9-2553-C6EE-AE084D6A85BE}"/>
               </a:ext>
             </a:extLst>
           </p:cNvPr>
@@ -2441,7 +2441,7 @@
           <p:cNvPr id="4" name="Szöveg helye 3">
             <a:extLst>
               <a:ext uri="{FF2B5EF4-FFF2-40B4-BE49-F238E27FC236}">
-                <a16:creationId xmlns:a16="http://schemas.microsoft.com/office/drawing/2014/main" id="{6E20636C-67A0-A9ED-9447-E65E3DBC68BE}"/>
+                <a16:creationId xmlns:a16="http://schemas.microsoft.com/office/drawing/2014/main" xmlns="" id="{6E20636C-67A0-A9ED-9447-E65E3DBC68BE}"/>
               </a:ext>
             </a:extLst>
           </p:cNvPr>
@@ -2512,7 +2512,7 @@
           <p:cNvPr id="5" name="Dátum helye 4">
             <a:extLst>
               <a:ext uri="{FF2B5EF4-FFF2-40B4-BE49-F238E27FC236}">
-                <a16:creationId xmlns:a16="http://schemas.microsoft.com/office/drawing/2014/main" id="{9F312683-9595-AE25-326A-8C5877B6B683}"/>
+                <a16:creationId xmlns:a16="http://schemas.microsoft.com/office/drawing/2014/main" xmlns="" id="{9F312683-9595-AE25-326A-8C5877B6B683}"/>
               </a:ext>
             </a:extLst>
           </p:cNvPr>
@@ -2530,7 +2530,7 @@
           <a:p>
             <a:fld id="{8E532DDB-289F-42C2-8F57-09A656E29423}" type="datetimeFigureOut">
               <a:rPr lang="hu-HU" smtClean="0"/>
-              <a:t>2024. 01. 24.</a:t>
+              <a:t>2024. 01. 25.</a:t>
             </a:fld>
             <a:endParaRPr lang="hu-HU"/>
           </a:p>
@@ -2541,7 +2541,7 @@
           <p:cNvPr id="6" name="Élőláb helye 5">
             <a:extLst>
               <a:ext uri="{FF2B5EF4-FFF2-40B4-BE49-F238E27FC236}">
-                <a16:creationId xmlns:a16="http://schemas.microsoft.com/office/drawing/2014/main" id="{8966127D-5FB5-31BD-9ADA-D2182F34B42E}"/>
+                <a16:creationId xmlns:a16="http://schemas.microsoft.com/office/drawing/2014/main" xmlns="" id="{8966127D-5FB5-31BD-9ADA-D2182F34B42E}"/>
               </a:ext>
             </a:extLst>
           </p:cNvPr>
@@ -2566,7 +2566,7 @@
           <p:cNvPr id="7" name="Dia számának helye 6">
             <a:extLst>
               <a:ext uri="{FF2B5EF4-FFF2-40B4-BE49-F238E27FC236}">
-                <a16:creationId xmlns:a16="http://schemas.microsoft.com/office/drawing/2014/main" id="{9D7BE2A7-FA0F-D1CB-4C81-4F42A7317EDA}"/>
+                <a16:creationId xmlns:a16="http://schemas.microsoft.com/office/drawing/2014/main" xmlns="" id="{9D7BE2A7-FA0F-D1CB-4C81-4F42A7317EDA}"/>
               </a:ext>
             </a:extLst>
           </p:cNvPr>
@@ -2625,7 +2625,7 @@
           <p:cNvPr id="2" name="Cím 1">
             <a:extLst>
               <a:ext uri="{FF2B5EF4-FFF2-40B4-BE49-F238E27FC236}">
-                <a16:creationId xmlns:a16="http://schemas.microsoft.com/office/drawing/2014/main" id="{B0784514-8C93-1D41-0ADC-AE65182FDD80}"/>
+                <a16:creationId xmlns:a16="http://schemas.microsoft.com/office/drawing/2014/main" xmlns="" id="{B0784514-8C93-1D41-0ADC-AE65182FDD80}"/>
               </a:ext>
             </a:extLst>
           </p:cNvPr>
@@ -2662,7 +2662,7 @@
           <p:cNvPr id="3" name="Kép helye 2">
             <a:extLst>
               <a:ext uri="{FF2B5EF4-FFF2-40B4-BE49-F238E27FC236}">
-                <a16:creationId xmlns:a16="http://schemas.microsoft.com/office/drawing/2014/main" id="{A322284F-F90F-B535-EB30-0E01F4BBCD18}"/>
+                <a16:creationId xmlns:a16="http://schemas.microsoft.com/office/drawing/2014/main" xmlns="" id="{A322284F-F90F-B535-EB30-0E01F4BBCD18}"/>
               </a:ext>
             </a:extLst>
           </p:cNvPr>
@@ -2729,7 +2729,7 @@
           <p:cNvPr id="4" name="Szöveg helye 3">
             <a:extLst>
               <a:ext uri="{FF2B5EF4-FFF2-40B4-BE49-F238E27FC236}">
-                <a16:creationId xmlns:a16="http://schemas.microsoft.com/office/drawing/2014/main" id="{D72DEB85-590B-1098-22C9-0A2BD35856A5}"/>
+                <a16:creationId xmlns:a16="http://schemas.microsoft.com/office/drawing/2014/main" xmlns="" id="{D72DEB85-590B-1098-22C9-0A2BD35856A5}"/>
               </a:ext>
             </a:extLst>
           </p:cNvPr>
@@ -2800,7 +2800,7 @@
           <p:cNvPr id="5" name="Dátum helye 4">
             <a:extLst>
               <a:ext uri="{FF2B5EF4-FFF2-40B4-BE49-F238E27FC236}">
-                <a16:creationId xmlns:a16="http://schemas.microsoft.com/office/drawing/2014/main" id="{FF0EEE38-B9C3-57C4-28D5-83BF2BDFBC37}"/>
+                <a16:creationId xmlns:a16="http://schemas.microsoft.com/office/drawing/2014/main" xmlns="" id="{FF0EEE38-B9C3-57C4-28D5-83BF2BDFBC37}"/>
               </a:ext>
             </a:extLst>
           </p:cNvPr>
@@ -2818,7 +2818,7 @@
           <a:p>
             <a:fld id="{8E532DDB-289F-42C2-8F57-09A656E29423}" type="datetimeFigureOut">
               <a:rPr lang="hu-HU" smtClean="0"/>
-              <a:t>2024. 01. 24.</a:t>
+              <a:t>2024. 01. 25.</a:t>
             </a:fld>
             <a:endParaRPr lang="hu-HU"/>
           </a:p>
@@ -2829,7 +2829,7 @@
           <p:cNvPr id="6" name="Élőláb helye 5">
             <a:extLst>
               <a:ext uri="{FF2B5EF4-FFF2-40B4-BE49-F238E27FC236}">
-                <a16:creationId xmlns:a16="http://schemas.microsoft.com/office/drawing/2014/main" id="{9A8C60BB-E846-A556-7D6F-80E4666550F6}"/>
+                <a16:creationId xmlns:a16="http://schemas.microsoft.com/office/drawing/2014/main" xmlns="" id="{9A8C60BB-E846-A556-7D6F-80E4666550F6}"/>
               </a:ext>
             </a:extLst>
           </p:cNvPr>
@@ -2854,7 +2854,7 @@
           <p:cNvPr id="7" name="Dia számának helye 6">
             <a:extLst>
               <a:ext uri="{FF2B5EF4-FFF2-40B4-BE49-F238E27FC236}">
-                <a16:creationId xmlns:a16="http://schemas.microsoft.com/office/drawing/2014/main" id="{F40C4142-B31B-0592-C73D-7D1D2251D700}"/>
+                <a16:creationId xmlns:a16="http://schemas.microsoft.com/office/drawing/2014/main" xmlns="" id="{F40C4142-B31B-0592-C73D-7D1D2251D700}"/>
               </a:ext>
             </a:extLst>
           </p:cNvPr>
@@ -2918,7 +2918,7 @@
           <p:cNvPr id="2" name="Cím helye 1">
             <a:extLst>
               <a:ext uri="{FF2B5EF4-FFF2-40B4-BE49-F238E27FC236}">
-                <a16:creationId xmlns:a16="http://schemas.microsoft.com/office/drawing/2014/main" id="{17782075-6685-2989-CE63-F72F6A17CA3B}"/>
+                <a16:creationId xmlns:a16="http://schemas.microsoft.com/office/drawing/2014/main" xmlns="" id="{17782075-6685-2989-CE63-F72F6A17CA3B}"/>
               </a:ext>
             </a:extLst>
           </p:cNvPr>
@@ -2956,7 +2956,7 @@
           <p:cNvPr id="3" name="Szöveg helye 2">
             <a:extLst>
               <a:ext uri="{FF2B5EF4-FFF2-40B4-BE49-F238E27FC236}">
-                <a16:creationId xmlns:a16="http://schemas.microsoft.com/office/drawing/2014/main" id="{62170818-01AE-3631-E7D4-F09960BC7755}"/>
+                <a16:creationId xmlns:a16="http://schemas.microsoft.com/office/drawing/2014/main" xmlns="" id="{62170818-01AE-3631-E7D4-F09960BC7755}"/>
               </a:ext>
             </a:extLst>
           </p:cNvPr>
@@ -3023,7 +3023,7 @@
           <p:cNvPr id="4" name="Dátum helye 3">
             <a:extLst>
               <a:ext uri="{FF2B5EF4-FFF2-40B4-BE49-F238E27FC236}">
-                <a16:creationId xmlns:a16="http://schemas.microsoft.com/office/drawing/2014/main" id="{5E44EABD-3951-FE87-043A-DEE26A772C31}"/>
+                <a16:creationId xmlns:a16="http://schemas.microsoft.com/office/drawing/2014/main" xmlns="" id="{5E44EABD-3951-FE87-043A-DEE26A772C31}"/>
               </a:ext>
             </a:extLst>
           </p:cNvPr>
@@ -3059,7 +3059,7 @@
           <a:p>
             <a:fld id="{8E532DDB-289F-42C2-8F57-09A656E29423}" type="datetimeFigureOut">
               <a:rPr lang="hu-HU" smtClean="0"/>
-              <a:t>2024. 01. 24.</a:t>
+              <a:t>2024. 01. 25.</a:t>
             </a:fld>
             <a:endParaRPr lang="hu-HU"/>
           </a:p>
@@ -3070,7 +3070,7 @@
           <p:cNvPr id="5" name="Élőláb helye 4">
             <a:extLst>
               <a:ext uri="{FF2B5EF4-FFF2-40B4-BE49-F238E27FC236}">
-                <a16:creationId xmlns:a16="http://schemas.microsoft.com/office/drawing/2014/main" id="{198D541F-EDD3-7ECD-372B-4F0F3E42E056}"/>
+                <a16:creationId xmlns:a16="http://schemas.microsoft.com/office/drawing/2014/main" xmlns="" id="{198D541F-EDD3-7ECD-372B-4F0F3E42E056}"/>
               </a:ext>
             </a:extLst>
           </p:cNvPr>
@@ -3113,7 +3113,7 @@
           <p:cNvPr id="6" name="Dia számának helye 5">
             <a:extLst>
               <a:ext uri="{FF2B5EF4-FFF2-40B4-BE49-F238E27FC236}">
-                <a16:creationId xmlns:a16="http://schemas.microsoft.com/office/drawing/2014/main" id="{3B1F9F43-DBAD-7623-FC58-2CBFA5EC9A4A}"/>
+                <a16:creationId xmlns:a16="http://schemas.microsoft.com/office/drawing/2014/main" xmlns="" id="{3B1F9F43-DBAD-7623-FC58-2CBFA5EC9A4A}"/>
               </a:ext>
             </a:extLst>
           </p:cNvPr>
@@ -3489,7 +3489,7 @@
           <p:cNvPr id="4" name="Ellipszis 3">
             <a:extLst>
               <a:ext uri="{FF2B5EF4-FFF2-40B4-BE49-F238E27FC236}">
-                <a16:creationId xmlns:a16="http://schemas.microsoft.com/office/drawing/2014/main" id="{5E590742-0F2F-708E-87FC-8CF5ABA75119}"/>
+                <a16:creationId xmlns:a16="http://schemas.microsoft.com/office/drawing/2014/main" xmlns="" id="{5E590742-0F2F-708E-87FC-8CF5ABA75119}"/>
               </a:ext>
             </a:extLst>
           </p:cNvPr>
@@ -3548,7 +3548,7 @@
           <p:cNvPr id="5" name="Ellipszis 4">
             <a:extLst>
               <a:ext uri="{FF2B5EF4-FFF2-40B4-BE49-F238E27FC236}">
-                <a16:creationId xmlns:a16="http://schemas.microsoft.com/office/drawing/2014/main" id="{7BFA035C-0E90-EF99-09EB-F01F1787B99D}"/>
+                <a16:creationId xmlns:a16="http://schemas.microsoft.com/office/drawing/2014/main" xmlns="" id="{7BFA035C-0E90-EF99-09EB-F01F1787B99D}"/>
               </a:ext>
             </a:extLst>
           </p:cNvPr>
@@ -3604,7 +3604,7 @@
           <p:cNvPr id="6" name="Téglalap: lekerekített 5">
             <a:extLst>
               <a:ext uri="{FF2B5EF4-FFF2-40B4-BE49-F238E27FC236}">
-                <a16:creationId xmlns:a16="http://schemas.microsoft.com/office/drawing/2014/main" id="{FF8E1E1E-E25D-9D44-58A0-641AE3D16840}"/>
+                <a16:creationId xmlns:a16="http://schemas.microsoft.com/office/drawing/2014/main" xmlns="" id="{FF8E1E1E-E25D-9D44-58A0-641AE3D16840}"/>
               </a:ext>
             </a:extLst>
           </p:cNvPr>
@@ -3670,7 +3670,7 @@
           <p:cNvPr id="7" name="Téglalap: lekerekített 6">
             <a:extLst>
               <a:ext uri="{FF2B5EF4-FFF2-40B4-BE49-F238E27FC236}">
-                <a16:creationId xmlns:a16="http://schemas.microsoft.com/office/drawing/2014/main" id="{876BD73A-04ED-68D6-0CFC-B55B322B54B6}"/>
+                <a16:creationId xmlns:a16="http://schemas.microsoft.com/office/drawing/2014/main" xmlns="" id="{876BD73A-04ED-68D6-0CFC-B55B322B54B6}"/>
               </a:ext>
             </a:extLst>
           </p:cNvPr>
@@ -3736,7 +3736,7 @@
           <p:cNvPr id="8" name="Téglalap: lekerekített 7">
             <a:extLst>
               <a:ext uri="{FF2B5EF4-FFF2-40B4-BE49-F238E27FC236}">
-                <a16:creationId xmlns:a16="http://schemas.microsoft.com/office/drawing/2014/main" id="{A949ACA4-0F6E-139B-8268-493DDA55C128}"/>
+                <a16:creationId xmlns:a16="http://schemas.microsoft.com/office/drawing/2014/main" xmlns="" id="{A949ACA4-0F6E-139B-8268-493DDA55C128}"/>
               </a:ext>
             </a:extLst>
           </p:cNvPr>
@@ -3802,7 +3802,7 @@
           <p:cNvPr id="9" name="Téglalap: lekerekített 8">
             <a:extLst>
               <a:ext uri="{FF2B5EF4-FFF2-40B4-BE49-F238E27FC236}">
-                <a16:creationId xmlns:a16="http://schemas.microsoft.com/office/drawing/2014/main" id="{D9B78EC0-CC66-2DDA-134B-90693F675712}"/>
+                <a16:creationId xmlns:a16="http://schemas.microsoft.com/office/drawing/2014/main" xmlns="" id="{D9B78EC0-CC66-2DDA-134B-90693F675712}"/>
               </a:ext>
             </a:extLst>
           </p:cNvPr>
@@ -3860,7 +3860,7 @@
           <p:cNvPr id="10" name="Téglalap: lekerekített 9">
             <a:extLst>
               <a:ext uri="{FF2B5EF4-FFF2-40B4-BE49-F238E27FC236}">
-                <a16:creationId xmlns:a16="http://schemas.microsoft.com/office/drawing/2014/main" id="{2E3A3B9D-563A-3AE1-8B49-D5C002EEA99D}"/>
+                <a16:creationId xmlns:a16="http://schemas.microsoft.com/office/drawing/2014/main" xmlns="" id="{2E3A3B9D-563A-3AE1-8B49-D5C002EEA99D}"/>
               </a:ext>
             </a:extLst>
           </p:cNvPr>
@@ -3926,7 +3926,7 @@
           <p:cNvPr id="11" name="Téglalap: lekerekített 10">
             <a:extLst>
               <a:ext uri="{FF2B5EF4-FFF2-40B4-BE49-F238E27FC236}">
-                <a16:creationId xmlns:a16="http://schemas.microsoft.com/office/drawing/2014/main" id="{DF3EB93E-2E32-E334-3C4E-462E031D3FD7}"/>
+                <a16:creationId xmlns:a16="http://schemas.microsoft.com/office/drawing/2014/main" xmlns="" id="{DF3EB93E-2E32-E334-3C4E-462E031D3FD7}"/>
               </a:ext>
             </a:extLst>
           </p:cNvPr>
@@ -3984,7 +3984,7 @@
           <p:cNvPr id="12" name="Téglalap: lekerekített 11">
             <a:extLst>
               <a:ext uri="{FF2B5EF4-FFF2-40B4-BE49-F238E27FC236}">
-                <a16:creationId xmlns:a16="http://schemas.microsoft.com/office/drawing/2014/main" id="{B12CDA0D-4782-C9A6-DEFD-8858E69E0D7B}"/>
+                <a16:creationId xmlns:a16="http://schemas.microsoft.com/office/drawing/2014/main" xmlns="" id="{B12CDA0D-4782-C9A6-DEFD-8858E69E0D7B}"/>
               </a:ext>
             </a:extLst>
           </p:cNvPr>
@@ -4050,7 +4050,7 @@
           <p:cNvPr id="13" name="Téglalap: lekerekített 12">
             <a:extLst>
               <a:ext uri="{FF2B5EF4-FFF2-40B4-BE49-F238E27FC236}">
-                <a16:creationId xmlns:a16="http://schemas.microsoft.com/office/drawing/2014/main" id="{74CFAF27-3E7A-F8C8-BD2F-DD4524B7DCE9}"/>
+                <a16:creationId xmlns:a16="http://schemas.microsoft.com/office/drawing/2014/main" xmlns="" id="{74CFAF27-3E7A-F8C8-BD2F-DD4524B7DCE9}"/>
               </a:ext>
             </a:extLst>
           </p:cNvPr>
@@ -4116,7 +4116,7 @@
           <p:cNvPr id="14" name="Téglalap: lekerekített 13">
             <a:extLst>
               <a:ext uri="{FF2B5EF4-FFF2-40B4-BE49-F238E27FC236}">
-                <a16:creationId xmlns:a16="http://schemas.microsoft.com/office/drawing/2014/main" id="{4FF50EB6-58FD-EF34-ECC2-721D27B4C713}"/>
+                <a16:creationId xmlns:a16="http://schemas.microsoft.com/office/drawing/2014/main" xmlns="" id="{4FF50EB6-58FD-EF34-ECC2-721D27B4C713}"/>
               </a:ext>
             </a:extLst>
           </p:cNvPr>
@@ -4174,7 +4174,7 @@
           <p:cNvPr id="15" name="Szövegdoboz 14">
             <a:extLst>
               <a:ext uri="{FF2B5EF4-FFF2-40B4-BE49-F238E27FC236}">
-                <a16:creationId xmlns:a16="http://schemas.microsoft.com/office/drawing/2014/main" id="{BAD904EC-5503-CAE6-53A8-7648AE393A9D}"/>
+                <a16:creationId xmlns:a16="http://schemas.microsoft.com/office/drawing/2014/main" xmlns="" id="{BAD904EC-5503-CAE6-53A8-7648AE393A9D}"/>
               </a:ext>
             </a:extLst>
           </p:cNvPr>
@@ -4203,7 +4203,7 @@
           <a:lstStyle/>
           <a:p>
             <a:r>
-              <a:rPr lang="hu-HU" sz="11000" dirty="0" err="1">
+              <a:rPr lang="hu-HU" sz="11000" dirty="0" smtClean="0">
                 <a:solidFill>
                   <a:schemeClr val="bg1"/>
                 </a:solidFill>
@@ -4241,7 +4241,7 @@
           <p:cNvPr id="16" name="Szövegdoboz 15">
             <a:extLst>
               <a:ext uri="{FF2B5EF4-FFF2-40B4-BE49-F238E27FC236}">
-                <a16:creationId xmlns:a16="http://schemas.microsoft.com/office/drawing/2014/main" id="{C9117FAE-FE67-5743-F7DB-0D7FE2C64D91}"/>
+                <a16:creationId xmlns:a16="http://schemas.microsoft.com/office/drawing/2014/main" xmlns="" id="{C9117FAE-FE67-5743-F7DB-0D7FE2C64D91}"/>
               </a:ext>
             </a:extLst>
           </p:cNvPr>
@@ -4274,6 +4274,10 @@
                 <a:latin typeface="Barlow" panose="020F0502020204030204" pitchFamily="2" charset="-18"/>
               </a:rPr>
               <a:t>5. Fejezet dokumentációja:</a:t>
+            </a:r>
+            <a:r>
+              <a:rPr lang="hu-HU" sz="2000" dirty="0"/>
+              <a:t/>
             </a:r>
             <a:br>
               <a:rPr lang="hu-HU" sz="2000" dirty="0"/>
@@ -4302,18 +4306,9 @@
   <p:clrMapOvr>
     <a:masterClrMapping/>
   </p:clrMapOvr>
-  <mc:AlternateContent xmlns:mc="http://schemas.openxmlformats.org/markup-compatibility/2006" xmlns:p14="http://schemas.microsoft.com/office/powerpoint/2010/main">
-    <mc:Choice Requires="p14">
-      <p:transition p14:dur="100">
-        <p:cut/>
-      </p:transition>
-    </mc:Choice>
-    <mc:Fallback xmlns="">
-      <p:transition>
-        <p:cut/>
-      </p:transition>
-    </mc:Fallback>
-  </mc:AlternateContent>
+  <p:transition spd="slow">
+    <p:push dir="u"/>
+  </p:transition>
   <p:timing>
     <p:tnLst>
       <p:par>
@@ -4978,12 +4973,672 @@
           <a:chExt cx="0" cy="0"/>
         </a:xfrm>
       </p:grpSpPr>
+      <p:grpSp>
+        <p:nvGrpSpPr>
+          <p:cNvPr id="3" name="Group 2"/>
+          <p:cNvGrpSpPr/>
+          <p:nvPr/>
+        </p:nvGrpSpPr>
+        <p:grpSpPr>
+          <a:xfrm>
+            <a:off x="880044" y="293914"/>
+            <a:ext cx="4784269" cy="6270171"/>
+            <a:chOff x="880044" y="293914"/>
+            <a:chExt cx="4784269" cy="6270171"/>
+          </a:xfrm>
+        </p:grpSpPr>
+        <p:sp>
+          <p:nvSpPr>
+            <p:cNvPr id="4" name="Téglalap: lekerekített 3">
+              <a:extLst>
+                <a:ext uri="{FF2B5EF4-FFF2-40B4-BE49-F238E27FC236}">
+                  <a16:creationId xmlns:a16="http://schemas.microsoft.com/office/drawing/2014/main" xmlns="" id="{BC187220-8284-1B2B-8CE3-7C613265D444}"/>
+                </a:ext>
+              </a:extLst>
+            </p:cNvPr>
+            <p:cNvSpPr/>
+            <p:nvPr/>
+          </p:nvSpPr>
+          <p:spPr>
+            <a:xfrm>
+              <a:off x="880044" y="293914"/>
+              <a:ext cx="4784269" cy="6270171"/>
+            </a:xfrm>
+            <a:prstGeom prst="roundRect">
+              <a:avLst>
+                <a:gd name="adj" fmla="val 4094"/>
+              </a:avLst>
+            </a:prstGeom>
+            <a:solidFill>
+              <a:schemeClr val="bg1">
+                <a:alpha val="80000"/>
+              </a:schemeClr>
+            </a:solidFill>
+            <a:ln w="120650" cap="sq">
+              <a:noFill/>
+              <a:round/>
+            </a:ln>
+          </p:spPr>
+          <p:style>
+            <a:lnRef idx="2">
+              <a:schemeClr val="accent1">
+                <a:shade val="15000"/>
+              </a:schemeClr>
+            </a:lnRef>
+            <a:fillRef idx="1">
+              <a:schemeClr val="accent1"/>
+            </a:fillRef>
+            <a:effectRef idx="0">
+              <a:schemeClr val="accent1"/>
+            </a:effectRef>
+            <a:fontRef idx="minor">
+              <a:schemeClr val="lt1"/>
+            </a:fontRef>
+          </p:style>
+          <p:txBody>
+            <a:bodyPr rtlCol="0" anchor="ctr"/>
+            <a:lstStyle/>
+            <a:p>
+              <a:pPr algn="ctr"/>
+              <a:endParaRPr lang="hu-HU" dirty="0"/>
+            </a:p>
+          </p:txBody>
+        </p:sp>
+        <p:sp>
+          <p:nvSpPr>
+            <p:cNvPr id="6" name="Szövegdoboz 5">
+              <a:extLst>
+                <a:ext uri="{FF2B5EF4-FFF2-40B4-BE49-F238E27FC236}">
+                  <a16:creationId xmlns:a16="http://schemas.microsoft.com/office/drawing/2014/main" xmlns="" id="{5B6AC857-2A98-66B3-8AC9-33FBAB3EDDF5}"/>
+                </a:ext>
+              </a:extLst>
+            </p:cNvPr>
+            <p:cNvSpPr txBox="1"/>
+            <p:nvPr/>
+          </p:nvSpPr>
+          <p:spPr>
+            <a:xfrm>
+              <a:off x="1128030" y="1597693"/>
+              <a:ext cx="4095750" cy="2031325"/>
+            </a:xfrm>
+            <a:prstGeom prst="rect">
+              <a:avLst/>
+            </a:prstGeom>
+            <a:noFill/>
+          </p:spPr>
+          <p:txBody>
+            <a:bodyPr wrap="square" rtlCol="0">
+              <a:spAutoFit/>
+            </a:bodyPr>
+            <a:lstStyle/>
+            <a:p>
+              <a:pPr algn="just"/>
+              <a:r>
+                <a:rPr lang="en-US" b="1" i="0" dirty="0">
+                  <a:solidFill>
+                    <a:srgbClr val="5019B3"/>
+                  </a:solidFill>
+                  <a:effectLst/>
+                  <a:latin typeface="Rubik"/>
+                </a:rPr>
+                <a:t>In </a:t>
+              </a:r>
+              <a:r>
+                <a:rPr lang="en-US" b="1" i="0" dirty="0" err="1">
+                  <a:solidFill>
+                    <a:srgbClr val="5019B3"/>
+                  </a:solidFill>
+                  <a:effectLst/>
+                  <a:latin typeface="Rubik"/>
+                </a:rPr>
+                <a:t>Pygame</a:t>
+              </a:r>
+              <a:r>
+                <a:rPr lang="en-US" b="1" i="0" dirty="0">
+                  <a:solidFill>
+                    <a:srgbClr val="5019B3"/>
+                  </a:solidFill>
+                  <a:effectLst/>
+                  <a:latin typeface="Rubik"/>
+                </a:rPr>
+                <a:t>, a sprite is an object that represents a game element. It can be an image, animation, or any other visual element in a game. </a:t>
+              </a:r>
+              <a:r>
+                <a:rPr lang="en-US" b="1" i="0" dirty="0" err="1">
+                  <a:solidFill>
+                    <a:srgbClr val="5019B3"/>
+                  </a:solidFill>
+                  <a:effectLst/>
+                  <a:latin typeface="Rubik"/>
+                </a:rPr>
+                <a:t>Pygame</a:t>
+              </a:r>
+              <a:r>
+                <a:rPr lang="en-US" b="1" i="0" dirty="0">
+                  <a:solidFill>
+                    <a:srgbClr val="5019B3"/>
+                  </a:solidFill>
+                  <a:effectLst/>
+                  <a:latin typeface="Rubik"/>
+                </a:rPr>
+                <a:t> provides a Sprite class that you can use to create and manage sprites efficiently.</a:t>
+              </a:r>
+              <a:r>
+                <a:rPr lang="en-US" dirty="0"/>
+                <a:t/>
+              </a:r>
+              <a:br>
+                <a:rPr lang="en-US" dirty="0"/>
+              </a:br>
+              <a:endParaRPr lang="hu-HU" dirty="0"/>
+            </a:p>
+          </p:txBody>
+        </p:sp>
+        <p:sp>
+          <p:nvSpPr>
+            <p:cNvPr id="7" name="Szövegdoboz 6">
+              <a:extLst>
+                <a:ext uri="{FF2B5EF4-FFF2-40B4-BE49-F238E27FC236}">
+                  <a16:creationId xmlns:a16="http://schemas.microsoft.com/office/drawing/2014/main" xmlns="" id="{7819F685-963E-271F-BC1B-FDA54155C9CE}"/>
+                </a:ext>
+              </a:extLst>
+            </p:cNvPr>
+            <p:cNvSpPr txBox="1"/>
+            <p:nvPr/>
+          </p:nvSpPr>
+          <p:spPr>
+            <a:xfrm>
+              <a:off x="1647142" y="735919"/>
+              <a:ext cx="3057525" cy="861774"/>
+            </a:xfrm>
+            <a:prstGeom prst="rect">
+              <a:avLst/>
+            </a:prstGeom>
+            <a:noFill/>
+          </p:spPr>
+          <p:txBody>
+            <a:bodyPr wrap="square" rtlCol="0">
+              <a:spAutoFit/>
+            </a:bodyPr>
+            <a:lstStyle/>
+            <a:p>
+              <a:pPr algn="ctr"/>
+              <a:r>
+                <a:rPr lang="hu-HU" sz="3200" b="1" i="0" dirty="0">
+                  <a:solidFill>
+                    <a:srgbClr val="5019B3"/>
+                  </a:solidFill>
+                  <a:effectLst/>
+                  <a:latin typeface="Rubik"/>
+                </a:rPr>
+                <a:t>Mi is az a </a:t>
+              </a:r>
+              <a:r>
+                <a:rPr lang="hu-HU" sz="3200" b="1" i="0" dirty="0" err="1">
+                  <a:solidFill>
+                    <a:srgbClr val="5019B3"/>
+                  </a:solidFill>
+                  <a:effectLst/>
+                  <a:latin typeface="Rubik"/>
+                </a:rPr>
+                <a:t>sprite</a:t>
+              </a:r>
+              <a:r>
+                <a:rPr lang="hu-HU" sz="3200" b="1" i="0" dirty="0">
+                  <a:solidFill>
+                    <a:srgbClr val="5019B3"/>
+                  </a:solidFill>
+                  <a:effectLst/>
+                  <a:latin typeface="Rubik"/>
+                </a:rPr>
+                <a:t>?</a:t>
+              </a:r>
+            </a:p>
+            <a:p>
+              <a:endParaRPr lang="hu-HU" dirty="0"/>
+            </a:p>
+          </p:txBody>
+        </p:sp>
+      </p:grpSp>
+      <p:sp>
+        <p:nvSpPr>
+          <p:cNvPr id="8" name="Téglalap: lekerekített 7">
+            <a:extLst>
+              <a:ext uri="{FF2B5EF4-FFF2-40B4-BE49-F238E27FC236}">
+                <a16:creationId xmlns:a16="http://schemas.microsoft.com/office/drawing/2014/main" xmlns="" id="{104486A8-B0E8-F708-7D72-B551D3E54053}"/>
+              </a:ext>
+            </a:extLst>
+          </p:cNvPr>
+          <p:cNvSpPr/>
+          <p:nvPr/>
+        </p:nvSpPr>
+        <p:spPr>
+          <a:xfrm>
+            <a:off x="6527687" y="3629018"/>
+            <a:ext cx="4784269" cy="2811242"/>
+          </a:xfrm>
+          <a:prstGeom prst="roundRect">
+            <a:avLst>
+              <a:gd name="adj" fmla="val 4094"/>
+            </a:avLst>
+          </a:prstGeom>
+          <a:solidFill>
+            <a:schemeClr val="bg1">
+              <a:alpha val="80000"/>
+            </a:schemeClr>
+          </a:solidFill>
+          <a:ln w="120650" cap="sq">
+            <a:noFill/>
+            <a:round/>
+          </a:ln>
+        </p:spPr>
+        <p:style>
+          <a:lnRef idx="2">
+            <a:schemeClr val="accent1">
+              <a:shade val="15000"/>
+            </a:schemeClr>
+          </a:lnRef>
+          <a:fillRef idx="1">
+            <a:schemeClr val="accent1"/>
+          </a:fillRef>
+          <a:effectRef idx="0">
+            <a:schemeClr val="accent1"/>
+          </a:effectRef>
+          <a:fontRef idx="minor">
+            <a:schemeClr val="lt1"/>
+          </a:fontRef>
+        </p:style>
+        <p:txBody>
+          <a:bodyPr rtlCol="0" anchor="ctr"/>
+          <a:lstStyle/>
+          <a:p>
+            <a:pPr algn="ctr"/>
+            <a:endParaRPr lang="hu-HU" dirty="0"/>
+          </a:p>
+        </p:txBody>
+      </p:sp>
+      <p:grpSp>
+        <p:nvGrpSpPr>
+          <p:cNvPr id="2" name="Group 1"/>
+          <p:cNvGrpSpPr/>
+          <p:nvPr/>
+        </p:nvGrpSpPr>
+        <p:grpSpPr>
+          <a:xfrm>
+            <a:off x="6527686" y="378290"/>
+            <a:ext cx="4784269" cy="2811242"/>
+            <a:chOff x="6527686" y="378290"/>
+            <a:chExt cx="4784269" cy="2811242"/>
+          </a:xfrm>
+        </p:grpSpPr>
+        <p:sp>
+          <p:nvSpPr>
+            <p:cNvPr id="5" name="Téglalap: lekerekített 4">
+              <a:extLst>
+                <a:ext uri="{FF2B5EF4-FFF2-40B4-BE49-F238E27FC236}">
+                  <a16:creationId xmlns:a16="http://schemas.microsoft.com/office/drawing/2014/main" xmlns="" id="{B74CBF98-6A67-702F-008D-E30CBEB44963}"/>
+                </a:ext>
+              </a:extLst>
+            </p:cNvPr>
+            <p:cNvSpPr/>
+            <p:nvPr/>
+          </p:nvSpPr>
+          <p:spPr>
+            <a:xfrm>
+              <a:off x="6527686" y="378290"/>
+              <a:ext cx="4784269" cy="2811242"/>
+            </a:xfrm>
+            <a:prstGeom prst="roundRect">
+              <a:avLst>
+                <a:gd name="adj" fmla="val 4094"/>
+              </a:avLst>
+            </a:prstGeom>
+            <a:solidFill>
+              <a:schemeClr val="bg1">
+                <a:alpha val="80000"/>
+              </a:schemeClr>
+            </a:solidFill>
+            <a:ln w="120650" cap="sq">
+              <a:noFill/>
+              <a:round/>
+            </a:ln>
+          </p:spPr>
+          <p:style>
+            <a:lnRef idx="2">
+              <a:schemeClr val="accent1">
+                <a:shade val="15000"/>
+              </a:schemeClr>
+            </a:lnRef>
+            <a:fillRef idx="1">
+              <a:schemeClr val="accent1"/>
+            </a:fillRef>
+            <a:effectRef idx="0">
+              <a:schemeClr val="accent1"/>
+            </a:effectRef>
+            <a:fontRef idx="minor">
+              <a:schemeClr val="lt1"/>
+            </a:fontRef>
+          </p:style>
+          <p:txBody>
+            <a:bodyPr rtlCol="0" anchor="ctr"/>
+            <a:lstStyle/>
+            <a:p>
+              <a:pPr algn="ctr"/>
+              <a:r>
+                <a:rPr lang="hu-HU" dirty="0" smtClean="0"/>
+                <a:t> </a:t>
+              </a:r>
+              <a:endParaRPr lang="hu-HU" dirty="0"/>
+            </a:p>
+          </p:txBody>
+        </p:sp>
+        <p:pic>
+          <p:nvPicPr>
+            <p:cNvPr id="1026" name="Picture 2">
+              <a:extLst>
+                <a:ext uri="{FF2B5EF4-FFF2-40B4-BE49-F238E27FC236}">
+                  <a16:creationId xmlns:a16="http://schemas.microsoft.com/office/drawing/2014/main" xmlns="" id="{7A82368D-859C-5EE3-8D89-77E6D75EAD7D}"/>
+                </a:ext>
+              </a:extLst>
+            </p:cNvPr>
+            <p:cNvPicPr>
+              <a:picLocks noChangeAspect="1" noChangeArrowheads="1"/>
+            </p:cNvPicPr>
+            <p:nvPr/>
+          </p:nvPicPr>
+          <p:blipFill>
+            <a:blip r:embed="rId2">
+              <a:extLst>
+                <a:ext uri="{28A0092B-C50C-407E-A947-70E740481C1C}">
+                  <a14:useLocalDpi xmlns:a14="http://schemas.microsoft.com/office/drawing/2010/main" val="0"/>
+                </a:ext>
+              </a:extLst>
+            </a:blip>
+            <a:srcRect/>
+            <a:stretch>
+              <a:fillRect/>
+            </a:stretch>
+          </p:blipFill>
+          <p:spPr bwMode="auto">
+            <a:xfrm>
+              <a:off x="6725670" y="1166806"/>
+              <a:ext cx="4388302" cy="1234210"/>
+            </a:xfrm>
+            <a:prstGeom prst="rect">
+              <a:avLst/>
+            </a:prstGeom>
+            <a:noFill/>
+            <a:extLst>
+              <a:ext uri="{909E8E84-426E-40DD-AFC4-6F175D3DCCD1}">
+                <a14:hiddenFill xmlns:a14="http://schemas.microsoft.com/office/drawing/2010/main">
+                  <a:solidFill>
+                    <a:srgbClr val="FFFFFF"/>
+                  </a:solidFill>
+                </a14:hiddenFill>
+              </a:ext>
+            </a:extLst>
+          </p:spPr>
+        </p:pic>
+      </p:grpSp>
+    </p:spTree>
+    <p:extLst>
+      <p:ext uri="{BB962C8B-B14F-4D97-AF65-F5344CB8AC3E}">
+        <p14:creationId xmlns:p14="http://schemas.microsoft.com/office/powerpoint/2010/main" val="2433985320"/>
+      </p:ext>
+    </p:extLst>
+  </p:cSld>
+  <p:clrMapOvr>
+    <a:masterClrMapping/>
+  </p:clrMapOvr>
+  <p:transition spd="slow">
+    <p:push dir="u"/>
+  </p:transition>
+  <p:timing>
+    <p:tnLst>
+      <p:par>
+        <p:cTn id="1" dur="indefinite" restart="never" nodeType="tmRoot">
+          <p:childTnLst>
+            <p:seq concurrent="1" nextAc="seek">
+              <p:cTn id="2" dur="indefinite" nodeType="mainSeq">
+                <p:childTnLst>
+                  <p:par>
+                    <p:cTn id="3" fill="hold">
+                      <p:stCondLst>
+                        <p:cond delay="indefinite"/>
+                      </p:stCondLst>
+                      <p:childTnLst>
+                        <p:par>
+                          <p:cTn id="4" fill="hold">
+                            <p:stCondLst>
+                              <p:cond delay="0"/>
+                            </p:stCondLst>
+                            <p:childTnLst>
+                              <p:par>
+                                <p:cTn id="5" presetID="2" presetClass="entr" presetSubtype="4" fill="hold" nodeType="clickEffect">
+                                  <p:stCondLst>
+                                    <p:cond delay="0"/>
+                                  </p:stCondLst>
+                                  <p:childTnLst>
+                                    <p:set>
+                                      <p:cBhvr>
+                                        <p:cTn id="6" dur="1" fill="hold">
+                                          <p:stCondLst>
+                                            <p:cond delay="0"/>
+                                          </p:stCondLst>
+                                        </p:cTn>
+                                        <p:tgtEl>
+                                          <p:spTgt spid="3"/>
+                                        </p:tgtEl>
+                                        <p:attrNameLst>
+                                          <p:attrName>style.visibility</p:attrName>
+                                        </p:attrNameLst>
+                                      </p:cBhvr>
+                                      <p:to>
+                                        <p:strVal val="visible"/>
+                                      </p:to>
+                                    </p:set>
+                                    <p:anim calcmode="lin" valueType="num">
+                                      <p:cBhvr additive="base">
+                                        <p:cTn id="7" dur="1000" fill="hold"/>
+                                        <p:tgtEl>
+                                          <p:spTgt spid="3"/>
+                                        </p:tgtEl>
+                                        <p:attrNameLst>
+                                          <p:attrName>ppt_x</p:attrName>
+                                        </p:attrNameLst>
+                                      </p:cBhvr>
+                                      <p:tavLst>
+                                        <p:tav tm="0">
+                                          <p:val>
+                                            <p:strVal val="#ppt_x"/>
+                                          </p:val>
+                                        </p:tav>
+                                        <p:tav tm="100000">
+                                          <p:val>
+                                            <p:strVal val="#ppt_x"/>
+                                          </p:val>
+                                        </p:tav>
+                                      </p:tavLst>
+                                    </p:anim>
+                                    <p:anim calcmode="lin" valueType="num">
+                                      <p:cBhvr additive="base">
+                                        <p:cTn id="8" dur="1000" fill="hold"/>
+                                        <p:tgtEl>
+                                          <p:spTgt spid="3"/>
+                                        </p:tgtEl>
+                                        <p:attrNameLst>
+                                          <p:attrName>ppt_y</p:attrName>
+                                        </p:attrNameLst>
+                                      </p:cBhvr>
+                                      <p:tavLst>
+                                        <p:tav tm="0">
+                                          <p:val>
+                                            <p:strVal val="1+#ppt_h/2"/>
+                                          </p:val>
+                                        </p:tav>
+                                        <p:tav tm="100000">
+                                          <p:val>
+                                            <p:strVal val="#ppt_y"/>
+                                          </p:val>
+                                        </p:tav>
+                                      </p:tavLst>
+                                    </p:anim>
+                                  </p:childTnLst>
+                                </p:cTn>
+                              </p:par>
+                            </p:childTnLst>
+                          </p:cTn>
+                        </p:par>
+                      </p:childTnLst>
+                    </p:cTn>
+                  </p:par>
+                  <p:par>
+                    <p:cTn id="9" fill="hold">
+                      <p:stCondLst>
+                        <p:cond delay="indefinite"/>
+                      </p:stCondLst>
+                      <p:childTnLst>
+                        <p:par>
+                          <p:cTn id="10" fill="hold">
+                            <p:stCondLst>
+                              <p:cond delay="0"/>
+                            </p:stCondLst>
+                            <p:childTnLst>
+                              <p:par>
+                                <p:cTn id="11" presetID="2" presetClass="entr" presetSubtype="4" fill="hold" nodeType="clickEffect">
+                                  <p:stCondLst>
+                                    <p:cond delay="0"/>
+                                  </p:stCondLst>
+                                  <p:childTnLst>
+                                    <p:set>
+                                      <p:cBhvr>
+                                        <p:cTn id="12" dur="1" fill="hold">
+                                          <p:stCondLst>
+                                            <p:cond delay="0"/>
+                                          </p:stCondLst>
+                                        </p:cTn>
+                                        <p:tgtEl>
+                                          <p:spTgt spid="2"/>
+                                        </p:tgtEl>
+                                        <p:attrNameLst>
+                                          <p:attrName>style.visibility</p:attrName>
+                                        </p:attrNameLst>
+                                      </p:cBhvr>
+                                      <p:to>
+                                        <p:strVal val="visible"/>
+                                      </p:to>
+                                    </p:set>
+                                    <p:anim calcmode="lin" valueType="num">
+                                      <p:cBhvr additive="base">
+                                        <p:cTn id="13" dur="1000" fill="hold"/>
+                                        <p:tgtEl>
+                                          <p:spTgt spid="2"/>
+                                        </p:tgtEl>
+                                        <p:attrNameLst>
+                                          <p:attrName>ppt_x</p:attrName>
+                                        </p:attrNameLst>
+                                      </p:cBhvr>
+                                      <p:tavLst>
+                                        <p:tav tm="0">
+                                          <p:val>
+                                            <p:strVal val="#ppt_x"/>
+                                          </p:val>
+                                        </p:tav>
+                                        <p:tav tm="100000">
+                                          <p:val>
+                                            <p:strVal val="#ppt_x"/>
+                                          </p:val>
+                                        </p:tav>
+                                      </p:tavLst>
+                                    </p:anim>
+                                    <p:anim calcmode="lin" valueType="num">
+                                      <p:cBhvr additive="base">
+                                        <p:cTn id="14" dur="1000" fill="hold"/>
+                                        <p:tgtEl>
+                                          <p:spTgt spid="2"/>
+                                        </p:tgtEl>
+                                        <p:attrNameLst>
+                                          <p:attrName>ppt_y</p:attrName>
+                                        </p:attrNameLst>
+                                      </p:cBhvr>
+                                      <p:tavLst>
+                                        <p:tav tm="0">
+                                          <p:val>
+                                            <p:strVal val="1+#ppt_h/2"/>
+                                          </p:val>
+                                        </p:tav>
+                                        <p:tav tm="100000">
+                                          <p:val>
+                                            <p:strVal val="#ppt_y"/>
+                                          </p:val>
+                                        </p:tav>
+                                      </p:tavLst>
+                                    </p:anim>
+                                  </p:childTnLst>
+                                </p:cTn>
+                              </p:par>
+                            </p:childTnLst>
+                          </p:cTn>
+                        </p:par>
+                      </p:childTnLst>
+                    </p:cTn>
+                  </p:par>
+                </p:childTnLst>
+              </p:cTn>
+              <p:prevCondLst>
+                <p:cond evt="onPrev" delay="0">
+                  <p:tgtEl>
+                    <p:sldTgt/>
+                  </p:tgtEl>
+                </p:cond>
+              </p:prevCondLst>
+              <p:nextCondLst>
+                <p:cond evt="onNext" delay="0">
+                  <p:tgtEl>
+                    <p:sldTgt/>
+                  </p:tgtEl>
+                </p:cond>
+              </p:nextCondLst>
+            </p:seq>
+          </p:childTnLst>
+        </p:cTn>
+      </p:par>
+    </p:tnLst>
+  </p:timing>
+</p:sld>
+</file>
+
+<file path=ppt/slides/slide3.xml><?xml version="1.0" encoding="utf-8"?>
+<p:sld xmlns:a="http://schemas.openxmlformats.org/drawingml/2006/main" xmlns:r="http://schemas.openxmlformats.org/officeDocument/2006/relationships" xmlns:p="http://schemas.openxmlformats.org/presentationml/2006/main">
+  <p:cSld>
+    <p:bg>
+      <p:bgPr>
+        <a:solidFill>
+          <a:srgbClr val="5019B3"/>
+        </a:solidFill>
+        <a:effectLst/>
+      </p:bgPr>
+    </p:bg>
+    <p:spTree>
+      <p:nvGrpSpPr>
+        <p:cNvPr id="1" name=""/>
+        <p:cNvGrpSpPr/>
+        <p:nvPr/>
+      </p:nvGrpSpPr>
+      <p:grpSpPr>
+        <a:xfrm>
+          <a:off x="0" y="0"/>
+          <a:ext cx="0" cy="0"/>
+          <a:chOff x="0" y="0"/>
+          <a:chExt cx="0" cy="0"/>
+        </a:xfrm>
+      </p:grpSpPr>
       <p:sp>
         <p:nvSpPr>
           <p:cNvPr id="4" name="Téglalap: lekerekített 3">
             <a:extLst>
               <a:ext uri="{FF2B5EF4-FFF2-40B4-BE49-F238E27FC236}">
-                <a16:creationId xmlns:a16="http://schemas.microsoft.com/office/drawing/2014/main" id="{BC187220-8284-1B2B-8CE3-7C613265D444}"/>
+                <a16:creationId xmlns:a16="http://schemas.microsoft.com/office/drawing/2014/main" xmlns="" id="{BC187220-8284-1B2B-8CE3-7C613265D444}"/>
               </a:ext>
             </a:extLst>
           </p:cNvPr>
@@ -5040,7 +5695,7 @@
           <p:cNvPr id="5" name="Téglalap: lekerekített 4">
             <a:extLst>
               <a:ext uri="{FF2B5EF4-FFF2-40B4-BE49-F238E27FC236}">
-                <a16:creationId xmlns:a16="http://schemas.microsoft.com/office/drawing/2014/main" id="{B74CBF98-6A67-702F-008D-E30CBEB44963}"/>
+                <a16:creationId xmlns:a16="http://schemas.microsoft.com/office/drawing/2014/main" xmlns="" id="{B74CBF98-6A67-702F-008D-E30CBEB44963}"/>
               </a:ext>
             </a:extLst>
           </p:cNvPr>
@@ -5049,8 +5704,8 @@
         </p:nvSpPr>
         <p:spPr>
           <a:xfrm>
-            <a:off x="6527687" y="417740"/>
-            <a:ext cx="4784269" cy="2811242"/>
+            <a:off x="6527687" y="293914"/>
+            <a:ext cx="4784269" cy="6270170"/>
           </a:xfrm>
           <a:prstGeom prst="roundRect">
             <a:avLst>
@@ -5097,7 +5752,7 @@
           <p:cNvPr id="6" name="Szövegdoboz 5">
             <a:extLst>
               <a:ext uri="{FF2B5EF4-FFF2-40B4-BE49-F238E27FC236}">
-                <a16:creationId xmlns:a16="http://schemas.microsoft.com/office/drawing/2014/main" id="{5B6AC857-2A98-66B3-8AC9-33FBAB3EDDF5}"/>
+                <a16:creationId xmlns:a16="http://schemas.microsoft.com/office/drawing/2014/main" xmlns="" id="{5B6AC857-2A98-66B3-8AC9-33FBAB3EDDF5}"/>
               </a:ext>
             </a:extLst>
           </p:cNvPr>
@@ -5171,6 +5826,10 @@
               </a:rPr>
               <a:t> provides a Sprite class that you can use to create and manage sprites efficiently.</a:t>
             </a:r>
+            <a:r>
+              <a:rPr lang="en-US" dirty="0"/>
+              <a:t/>
+            </a:r>
             <a:br>
               <a:rPr lang="en-US" dirty="0"/>
             </a:br>
@@ -5183,7 +5842,7 @@
           <p:cNvPr id="7" name="Szövegdoboz 6">
             <a:extLst>
               <a:ext uri="{FF2B5EF4-FFF2-40B4-BE49-F238E27FC236}">
-                <a16:creationId xmlns:a16="http://schemas.microsoft.com/office/drawing/2014/main" id="{7819F685-963E-271F-BC1B-FDA54155C9CE}"/>
+                <a16:creationId xmlns:a16="http://schemas.microsoft.com/office/drawing/2014/main" xmlns="" id="{7819F685-963E-271F-BC1B-FDA54155C9CE}"/>
               </a:ext>
             </a:extLst>
           </p:cNvPr>
@@ -5243,124 +5902,147 @@
           </a:p>
         </p:txBody>
       </p:sp>
-      <p:sp>
-        <p:nvSpPr>
-          <p:cNvPr id="8" name="Téglalap: lekerekített 7">
-            <a:extLst>
-              <a:ext uri="{FF2B5EF4-FFF2-40B4-BE49-F238E27FC236}">
-                <a16:creationId xmlns:a16="http://schemas.microsoft.com/office/drawing/2014/main" id="{104486A8-B0E8-F708-7D72-B551D3E54053}"/>
-              </a:ext>
-            </a:extLst>
-          </p:cNvPr>
-          <p:cNvSpPr/>
-          <p:nvPr/>
-        </p:nvSpPr>
-        <p:spPr>
-          <a:xfrm>
-            <a:off x="6527687" y="3629018"/>
-            <a:ext cx="4784269" cy="2811242"/>
-          </a:xfrm>
-          <a:prstGeom prst="roundRect">
-            <a:avLst>
-              <a:gd name="adj" fmla="val 4094"/>
-            </a:avLst>
-          </a:prstGeom>
-          <a:solidFill>
-            <a:schemeClr val="bg1">
-              <a:alpha val="80000"/>
-            </a:schemeClr>
-          </a:solidFill>
-          <a:ln w="120650" cap="sq">
-            <a:noFill/>
-            <a:round/>
-          </a:ln>
-        </p:spPr>
-        <p:style>
-          <a:lnRef idx="2">
-            <a:schemeClr val="accent1">
-              <a:shade val="15000"/>
-            </a:schemeClr>
-          </a:lnRef>
-          <a:fillRef idx="1">
-            <a:schemeClr val="accent1"/>
-          </a:fillRef>
-          <a:effectRef idx="0">
-            <a:schemeClr val="accent1"/>
-          </a:effectRef>
-          <a:fontRef idx="minor">
-            <a:schemeClr val="lt1"/>
-          </a:fontRef>
-        </p:style>
-        <p:txBody>
-          <a:bodyPr rtlCol="0" anchor="ctr"/>
-          <a:lstStyle/>
-          <a:p>
-            <a:pPr algn="ctr"/>
-            <a:endParaRPr lang="hu-HU" dirty="0"/>
-          </a:p>
-        </p:txBody>
-      </p:sp>
-      <p:pic>
-        <p:nvPicPr>
-          <p:cNvPr id="1026" name="Picture 2">
-            <a:extLst>
-              <a:ext uri="{FF2B5EF4-FFF2-40B4-BE49-F238E27FC236}">
-                <a16:creationId xmlns:a16="http://schemas.microsoft.com/office/drawing/2014/main" id="{7A82368D-859C-5EE3-8D89-77E6D75EAD7D}"/>
-              </a:ext>
-            </a:extLst>
-          </p:cNvPr>
-          <p:cNvPicPr>
-            <a:picLocks noChangeAspect="1" noChangeArrowheads="1"/>
-          </p:cNvPicPr>
-          <p:nvPr/>
-        </p:nvPicPr>
-        <p:blipFill>
-          <a:blip r:embed="rId2">
-            <a:extLst>
-              <a:ext uri="{28A0092B-C50C-407E-A947-70E740481C1C}">
-                <a14:useLocalDpi xmlns:a14="http://schemas.microsoft.com/office/drawing/2010/main" val="0"/>
-              </a:ext>
-            </a:extLst>
-          </a:blip>
-          <a:srcRect/>
-          <a:stretch>
-            <a:fillRect/>
-          </a:stretch>
-        </p:blipFill>
-        <p:spPr bwMode="auto">
-          <a:xfrm>
-            <a:off x="6725670" y="1166806"/>
-            <a:ext cx="4388302" cy="1234210"/>
-          </a:xfrm>
-          <a:prstGeom prst="rect">
-            <a:avLst/>
-          </a:prstGeom>
-          <a:noFill/>
-          <a:extLst>
-            <a:ext uri="{909E8E84-426E-40DD-AFC4-6F175D3DCCD1}">
-              <a14:hiddenFill xmlns:a14="http://schemas.microsoft.com/office/drawing/2010/main">
-                <a:solidFill>
-                  <a:srgbClr val="FFFFFF"/>
-                </a:solidFill>
-              </a14:hiddenFill>
-            </a:ext>
-          </a:extLst>
-        </p:spPr>
-      </p:pic>
     </p:spTree>
     <p:extLst>
       <p:ext uri="{BB962C8B-B14F-4D97-AF65-F5344CB8AC3E}">
-        <p14:creationId xmlns:p14="http://schemas.microsoft.com/office/powerpoint/2010/main" val="2989583105"/>
+        <p14:creationId xmlns:p14="http://schemas.microsoft.com/office/powerpoint/2010/main" val="1827483191"/>
       </p:ext>
     </p:extLst>
   </p:cSld>
   <p:clrMapOvr>
     <a:masterClrMapping/>
   </p:clrMapOvr>
+  <p:transition spd="slow">
+    <p:push dir="u"/>
+  </p:transition>
+  <p:timing>
+    <p:tnLst>
+      <p:par>
+        <p:cTn id="1" dur="indefinite" restart="never" nodeType="tmRoot">
+          <p:childTnLst>
+            <p:seq concurrent="1" nextAc="seek">
+              <p:cTn id="2" dur="indefinite" nodeType="mainSeq">
+                <p:childTnLst>
+                  <p:par>
+                    <p:cTn id="3" fill="hold">
+                      <p:stCondLst>
+                        <p:cond delay="indefinite"/>
+                      </p:stCondLst>
+                      <p:childTnLst>
+                        <p:par>
+                          <p:cTn id="4" fill="hold">
+                            <p:stCondLst>
+                              <p:cond delay="0"/>
+                            </p:stCondLst>
+                            <p:childTnLst>
+                              <p:par>
+                                <p:cTn id="5" presetID="2" presetClass="entr" presetSubtype="4" fill="hold" grpId="0" nodeType="clickEffect">
+                                  <p:stCondLst>
+                                    <p:cond delay="0"/>
+                                  </p:stCondLst>
+                                  <p:childTnLst>
+                                    <p:set>
+                                      <p:cBhvr>
+                                        <p:cTn id="6" dur="1" fill="hold">
+                                          <p:stCondLst>
+                                            <p:cond delay="0"/>
+                                          </p:stCondLst>
+                                        </p:cTn>
+                                        <p:tgtEl>
+                                          <p:spTgt spid="5"/>
+                                        </p:tgtEl>
+                                        <p:attrNameLst>
+                                          <p:attrName>style.visibility</p:attrName>
+                                        </p:attrNameLst>
+                                      </p:cBhvr>
+                                      <p:to>
+                                        <p:strVal val="visible"/>
+                                      </p:to>
+                                    </p:set>
+                                    <p:anim calcmode="lin" valueType="num">
+                                      <p:cBhvr additive="base">
+                                        <p:cTn id="7" dur="1000" fill="hold"/>
+                                        <p:tgtEl>
+                                          <p:spTgt spid="5"/>
+                                        </p:tgtEl>
+                                        <p:attrNameLst>
+                                          <p:attrName>ppt_x</p:attrName>
+                                        </p:attrNameLst>
+                                      </p:cBhvr>
+                                      <p:tavLst>
+                                        <p:tav tm="0">
+                                          <p:val>
+                                            <p:strVal val="#ppt_x"/>
+                                          </p:val>
+                                        </p:tav>
+                                        <p:tav tm="100000">
+                                          <p:val>
+                                            <p:strVal val="#ppt_x"/>
+                                          </p:val>
+                                        </p:tav>
+                                      </p:tavLst>
+                                    </p:anim>
+                                    <p:anim calcmode="lin" valueType="num">
+                                      <p:cBhvr additive="base">
+                                        <p:cTn id="8" dur="1000" fill="hold"/>
+                                        <p:tgtEl>
+                                          <p:spTgt spid="5"/>
+                                        </p:tgtEl>
+                                        <p:attrNameLst>
+                                          <p:attrName>ppt_y</p:attrName>
+                                        </p:attrNameLst>
+                                      </p:cBhvr>
+                                      <p:tavLst>
+                                        <p:tav tm="0">
+                                          <p:val>
+                                            <p:strVal val="1+#ppt_h/2"/>
+                                          </p:val>
+                                        </p:tav>
+                                        <p:tav tm="100000">
+                                          <p:val>
+                                            <p:strVal val="#ppt_y"/>
+                                          </p:val>
+                                        </p:tav>
+                                      </p:tavLst>
+                                    </p:anim>
+                                  </p:childTnLst>
+                                </p:cTn>
+                              </p:par>
+                            </p:childTnLst>
+                          </p:cTn>
+                        </p:par>
+                      </p:childTnLst>
+                    </p:cTn>
+                  </p:par>
+                </p:childTnLst>
+              </p:cTn>
+              <p:prevCondLst>
+                <p:cond evt="onPrev" delay="0">
+                  <p:tgtEl>
+                    <p:sldTgt/>
+                  </p:tgtEl>
+                </p:cond>
+              </p:prevCondLst>
+              <p:nextCondLst>
+                <p:cond evt="onNext" delay="0">
+                  <p:tgtEl>
+                    <p:sldTgt/>
+                  </p:tgtEl>
+                </p:cond>
+              </p:nextCondLst>
+            </p:seq>
+          </p:childTnLst>
+        </p:cTn>
+      </p:par>
+    </p:tnLst>
+    <p:bldLst>
+      <p:bldP spid="5" grpId="0" animBg="1"/>
+    </p:bldLst>
+  </p:timing>
 </p:sld>
 </file>
 
-<file path=ppt/slides/slide3.xml><?xml version="1.0" encoding="utf-8"?>
+<file path=ppt/slides/slide4.xml><?xml version="1.0" encoding="utf-8"?>
 <p:sld xmlns:a="http://schemas.openxmlformats.org/drawingml/2006/main" xmlns:r="http://schemas.openxmlformats.org/officeDocument/2006/relationships" xmlns:p="http://schemas.openxmlformats.org/presentationml/2006/main">
   <p:cSld>
     <p:bg>
@@ -5387,67 +6069,60 @@
       </p:grpSpPr>
       <p:sp>
         <p:nvSpPr>
-          <p:cNvPr id="4" name="Téglalap: lekerekített 3">
-            <a:extLst>
-              <a:ext uri="{FF2B5EF4-FFF2-40B4-BE49-F238E27FC236}">
-                <a16:creationId xmlns:a16="http://schemas.microsoft.com/office/drawing/2014/main" id="{BC187220-8284-1B2B-8CE3-7C613265D444}"/>
-              </a:ext>
-            </a:extLst>
-          </p:cNvPr>
-          <p:cNvSpPr/>
-          <p:nvPr/>
-        </p:nvSpPr>
-        <p:spPr>
-          <a:xfrm>
-            <a:off x="880044" y="293914"/>
-            <a:ext cx="4784269" cy="6270171"/>
-          </a:xfrm>
-          <a:prstGeom prst="roundRect">
-            <a:avLst>
-              <a:gd name="adj" fmla="val 4094"/>
-            </a:avLst>
-          </a:prstGeom>
-          <a:solidFill>
-            <a:schemeClr val="bg1">
-              <a:alpha val="80000"/>
-            </a:schemeClr>
-          </a:solidFill>
-          <a:ln w="120650" cap="sq">
-            <a:noFill/>
-            <a:round/>
-          </a:ln>
-        </p:spPr>
-        <p:style>
-          <a:lnRef idx="2">
-            <a:schemeClr val="accent1">
-              <a:shade val="15000"/>
-            </a:schemeClr>
-          </a:lnRef>
-          <a:fillRef idx="1">
-            <a:schemeClr val="accent1"/>
-          </a:fillRef>
-          <a:effectRef idx="0">
-            <a:schemeClr val="accent1"/>
-          </a:effectRef>
-          <a:fontRef idx="minor">
-            <a:schemeClr val="lt1"/>
-          </a:fontRef>
-        </p:style>
-        <p:txBody>
-          <a:bodyPr rtlCol="0" anchor="ctr"/>
+          <p:cNvPr id="2" name="Cím 1">
+            <a:extLst>
+              <a:ext uri="{FF2B5EF4-FFF2-40B4-BE49-F238E27FC236}">
+                <a16:creationId xmlns:a16="http://schemas.microsoft.com/office/drawing/2014/main" xmlns="" id="{D1CE9B8A-DB08-5227-4E90-0FE396A4D141}"/>
+              </a:ext>
+            </a:extLst>
+          </p:cNvPr>
+          <p:cNvSpPr>
+            <a:spLocks noGrp="1"/>
+          </p:cNvSpPr>
+          <p:nvPr>
+            <p:ph type="ctrTitle"/>
+          </p:nvPr>
+        </p:nvSpPr>
+        <p:spPr/>
+        <p:txBody>
+          <a:bodyPr/>
           <a:lstStyle/>
           <a:p>
-            <a:pPr algn="ctr"/>
-            <a:endParaRPr lang="hu-HU" dirty="0"/>
-          </a:p>
-        </p:txBody>
-      </p:sp>
-      <p:sp>
-        <p:nvSpPr>
-          <p:cNvPr id="5" name="Téglalap: lekerekített 4">
-            <a:extLst>
-              <a:ext uri="{FF2B5EF4-FFF2-40B4-BE49-F238E27FC236}">
-                <a16:creationId xmlns:a16="http://schemas.microsoft.com/office/drawing/2014/main" id="{B74CBF98-6A67-702F-008D-E30CBEB44963}"/>
+            <a:endParaRPr lang="hu-HU"/>
+          </a:p>
+        </p:txBody>
+      </p:sp>
+      <p:sp>
+        <p:nvSpPr>
+          <p:cNvPr id="3" name="Alcím 2">
+            <a:extLst>
+              <a:ext uri="{FF2B5EF4-FFF2-40B4-BE49-F238E27FC236}">
+                <a16:creationId xmlns:a16="http://schemas.microsoft.com/office/drawing/2014/main" xmlns="" id="{33E051B4-6ACD-E318-EC79-47D89175A6C0}"/>
+              </a:ext>
+            </a:extLst>
+          </p:cNvPr>
+          <p:cNvSpPr>
+            <a:spLocks noGrp="1"/>
+          </p:cNvSpPr>
+          <p:nvPr>
+            <p:ph type="subTitle" idx="1"/>
+          </p:nvPr>
+        </p:nvSpPr>
+        <p:spPr/>
+        <p:txBody>
+          <a:bodyPr/>
+          <a:lstStyle/>
+          <a:p>
+            <a:endParaRPr lang="hu-HU"/>
+          </a:p>
+        </p:txBody>
+      </p:sp>
+      <p:sp>
+        <p:nvSpPr>
+          <p:cNvPr id="4" name="Téglalap: lekerekített 4">
+            <a:extLst>
+              <a:ext uri="{FF2B5EF4-FFF2-40B4-BE49-F238E27FC236}">
+                <a16:creationId xmlns:a16="http://schemas.microsoft.com/office/drawing/2014/main" xmlns="" id="{B74CBF98-6A67-702F-008D-E30CBEB44963}"/>
               </a:ext>
             </a:extLst>
           </p:cNvPr>
@@ -5499,574 +6174,26 @@
           </a:p>
         </p:txBody>
       </p:sp>
-      <p:sp>
-        <p:nvSpPr>
-          <p:cNvPr id="6" name="Szövegdoboz 5">
-            <a:extLst>
-              <a:ext uri="{FF2B5EF4-FFF2-40B4-BE49-F238E27FC236}">
-                <a16:creationId xmlns:a16="http://schemas.microsoft.com/office/drawing/2014/main" id="{5B6AC857-2A98-66B3-8AC9-33FBAB3EDDF5}"/>
-              </a:ext>
-            </a:extLst>
-          </p:cNvPr>
-          <p:cNvSpPr txBox="1"/>
-          <p:nvPr/>
-        </p:nvSpPr>
-        <p:spPr>
-          <a:xfrm>
-            <a:off x="1128030" y="1597693"/>
-            <a:ext cx="4095750" cy="2031325"/>
-          </a:xfrm>
-          <a:prstGeom prst="rect">
-            <a:avLst/>
-          </a:prstGeom>
-          <a:noFill/>
-        </p:spPr>
-        <p:txBody>
-          <a:bodyPr wrap="square" rtlCol="0">
-            <a:spAutoFit/>
-          </a:bodyPr>
-          <a:lstStyle/>
-          <a:p>
-            <a:pPr algn="just"/>
-            <a:r>
-              <a:rPr lang="en-US" b="1" i="0" dirty="0">
-                <a:solidFill>
-                  <a:srgbClr val="5019B3"/>
-                </a:solidFill>
-                <a:effectLst/>
-                <a:latin typeface="Rubik"/>
-              </a:rPr>
-              <a:t>In </a:t>
-            </a:r>
-            <a:r>
-              <a:rPr lang="en-US" b="1" i="0" dirty="0" err="1">
-                <a:solidFill>
-                  <a:srgbClr val="5019B3"/>
-                </a:solidFill>
-                <a:effectLst/>
-                <a:latin typeface="Rubik"/>
-              </a:rPr>
-              <a:t>Pygame</a:t>
-            </a:r>
-            <a:r>
-              <a:rPr lang="en-US" b="1" i="0" dirty="0">
-                <a:solidFill>
-                  <a:srgbClr val="5019B3"/>
-                </a:solidFill>
-                <a:effectLst/>
-                <a:latin typeface="Rubik"/>
-              </a:rPr>
-              <a:t>, a sprite is an object that represents a game element. It can be an image, animation, or any other visual element in a game. </a:t>
-            </a:r>
-            <a:r>
-              <a:rPr lang="en-US" b="1" i="0" dirty="0" err="1">
-                <a:solidFill>
-                  <a:srgbClr val="5019B3"/>
-                </a:solidFill>
-                <a:effectLst/>
-                <a:latin typeface="Rubik"/>
-              </a:rPr>
-              <a:t>Pygame</a:t>
-            </a:r>
-            <a:r>
-              <a:rPr lang="en-US" b="1" i="0" dirty="0">
-                <a:solidFill>
-                  <a:srgbClr val="5019B3"/>
-                </a:solidFill>
-                <a:effectLst/>
-                <a:latin typeface="Rubik"/>
-              </a:rPr>
-              <a:t> provides a Sprite class that you can use to create and manage sprites efficiently.</a:t>
-            </a:r>
-            <a:br>
-              <a:rPr lang="en-US" dirty="0"/>
-            </a:br>
-            <a:endParaRPr lang="hu-HU" dirty="0"/>
-          </a:p>
-        </p:txBody>
-      </p:sp>
-      <p:sp>
-        <p:nvSpPr>
-          <p:cNvPr id="7" name="Szövegdoboz 6">
-            <a:extLst>
-              <a:ext uri="{FF2B5EF4-FFF2-40B4-BE49-F238E27FC236}">
-                <a16:creationId xmlns:a16="http://schemas.microsoft.com/office/drawing/2014/main" id="{7819F685-963E-271F-BC1B-FDA54155C9CE}"/>
-              </a:ext>
-            </a:extLst>
-          </p:cNvPr>
-          <p:cNvSpPr txBox="1"/>
-          <p:nvPr/>
-        </p:nvSpPr>
-        <p:spPr>
-          <a:xfrm>
-            <a:off x="1647142" y="735919"/>
-            <a:ext cx="3057525" cy="861774"/>
-          </a:xfrm>
-          <a:prstGeom prst="rect">
-            <a:avLst/>
-          </a:prstGeom>
-          <a:noFill/>
-        </p:spPr>
-        <p:txBody>
-          <a:bodyPr wrap="square" rtlCol="0">
-            <a:spAutoFit/>
-          </a:bodyPr>
-          <a:lstStyle/>
-          <a:p>
-            <a:pPr algn="ctr"/>
-            <a:r>
-              <a:rPr lang="hu-HU" sz="3200" b="1" i="0" dirty="0">
-                <a:solidFill>
-                  <a:srgbClr val="5019B3"/>
-                </a:solidFill>
-                <a:effectLst/>
-                <a:latin typeface="Rubik"/>
-              </a:rPr>
-              <a:t>Mi is az a </a:t>
-            </a:r>
-            <a:r>
-              <a:rPr lang="hu-HU" sz="3200" b="1" i="0" dirty="0" err="1">
-                <a:solidFill>
-                  <a:srgbClr val="5019B3"/>
-                </a:solidFill>
-                <a:effectLst/>
-                <a:latin typeface="Rubik"/>
-              </a:rPr>
-              <a:t>sprite</a:t>
-            </a:r>
-            <a:r>
-              <a:rPr lang="hu-HU" sz="3200" b="1" i="0" dirty="0">
-                <a:solidFill>
-                  <a:srgbClr val="5019B3"/>
-                </a:solidFill>
-                <a:effectLst/>
-                <a:latin typeface="Rubik"/>
-              </a:rPr>
-              <a:t>?</a:t>
-            </a:r>
-          </a:p>
-          <a:p>
-            <a:endParaRPr lang="hu-HU" dirty="0"/>
-          </a:p>
-        </p:txBody>
-      </p:sp>
     </p:spTree>
     <p:extLst>
       <p:ext uri="{BB962C8B-B14F-4D97-AF65-F5344CB8AC3E}">
-        <p14:creationId xmlns:p14="http://schemas.microsoft.com/office/powerpoint/2010/main" val="1827483191"/>
+        <p14:creationId xmlns:p14="http://schemas.microsoft.com/office/powerpoint/2010/main" val="605018872"/>
       </p:ext>
     </p:extLst>
   </p:cSld>
   <p:clrMapOvr>
     <a:masterClrMapping/>
   </p:clrMapOvr>
-</p:sld>
-</file>
-
-<file path=ppt/slides/slide4.xml><?xml version="1.0" encoding="utf-8"?>
-<p:sld xmlns:a="http://schemas.openxmlformats.org/drawingml/2006/main" xmlns:r="http://schemas.openxmlformats.org/officeDocument/2006/relationships" xmlns:p="http://schemas.openxmlformats.org/presentationml/2006/main">
-  <p:cSld>
-    <p:bg>
-      <p:bgPr>
-        <a:solidFill>
-          <a:srgbClr val="5019B3"/>
-        </a:solidFill>
-        <a:effectLst/>
-      </p:bgPr>
-    </p:bg>
-    <p:spTree>
-      <p:nvGrpSpPr>
-        <p:cNvPr id="1" name=""/>
-        <p:cNvGrpSpPr/>
-        <p:nvPr/>
-      </p:nvGrpSpPr>
-      <p:grpSpPr>
-        <a:xfrm>
-          <a:off x="0" y="0"/>
-          <a:ext cx="0" cy="0"/>
-          <a:chOff x="0" y="0"/>
-          <a:chExt cx="0" cy="0"/>
-        </a:xfrm>
-      </p:grpSpPr>
-      <p:sp>
-        <p:nvSpPr>
-          <p:cNvPr id="4" name="Téglalap: lekerekített 3">
-            <a:extLst>
-              <a:ext uri="{FF2B5EF4-FFF2-40B4-BE49-F238E27FC236}">
-                <a16:creationId xmlns:a16="http://schemas.microsoft.com/office/drawing/2014/main" id="{BC187220-8284-1B2B-8CE3-7C613265D444}"/>
-              </a:ext>
-            </a:extLst>
-          </p:cNvPr>
-          <p:cNvSpPr/>
-          <p:nvPr/>
-        </p:nvSpPr>
-        <p:spPr>
-          <a:xfrm>
-            <a:off x="880044" y="293914"/>
-            <a:ext cx="4784269" cy="6270171"/>
-          </a:xfrm>
-          <a:prstGeom prst="roundRect">
-            <a:avLst>
-              <a:gd name="adj" fmla="val 4094"/>
-            </a:avLst>
-          </a:prstGeom>
-          <a:solidFill>
-            <a:schemeClr val="bg1">
-              <a:alpha val="80000"/>
-            </a:schemeClr>
-          </a:solidFill>
-          <a:ln w="120650" cap="sq">
-            <a:noFill/>
-            <a:round/>
-          </a:ln>
-        </p:spPr>
-        <p:style>
-          <a:lnRef idx="2">
-            <a:schemeClr val="accent1">
-              <a:shade val="15000"/>
-            </a:schemeClr>
-          </a:lnRef>
-          <a:fillRef idx="1">
-            <a:schemeClr val="accent1"/>
-          </a:fillRef>
-          <a:effectRef idx="0">
-            <a:schemeClr val="accent1"/>
-          </a:effectRef>
-          <a:fontRef idx="minor">
-            <a:schemeClr val="lt1"/>
-          </a:fontRef>
-        </p:style>
-        <p:txBody>
-          <a:bodyPr rtlCol="0" anchor="ctr"/>
-          <a:lstStyle/>
-          <a:p>
-            <a:pPr algn="ctr"/>
-            <a:endParaRPr lang="hu-HU" dirty="0"/>
-          </a:p>
-        </p:txBody>
-      </p:sp>
-      <p:sp>
-        <p:nvSpPr>
-          <p:cNvPr id="5" name="Téglalap: lekerekített 4">
-            <a:extLst>
-              <a:ext uri="{FF2B5EF4-FFF2-40B4-BE49-F238E27FC236}">
-                <a16:creationId xmlns:a16="http://schemas.microsoft.com/office/drawing/2014/main" id="{B74CBF98-6A67-702F-008D-E30CBEB44963}"/>
-              </a:ext>
-            </a:extLst>
-          </p:cNvPr>
-          <p:cNvSpPr/>
-          <p:nvPr/>
-        </p:nvSpPr>
-        <p:spPr>
-          <a:xfrm>
-            <a:off x="6527687" y="417740"/>
-            <a:ext cx="4784269" cy="2811242"/>
-          </a:xfrm>
-          <a:prstGeom prst="roundRect">
-            <a:avLst>
-              <a:gd name="adj" fmla="val 4094"/>
-            </a:avLst>
-          </a:prstGeom>
-          <a:solidFill>
-            <a:schemeClr val="bg1">
-              <a:alpha val="80000"/>
-            </a:schemeClr>
-          </a:solidFill>
-          <a:ln w="120650" cap="sq">
-            <a:noFill/>
-            <a:round/>
-          </a:ln>
-        </p:spPr>
-        <p:style>
-          <a:lnRef idx="2">
-            <a:schemeClr val="accent1">
-              <a:shade val="15000"/>
-            </a:schemeClr>
-          </a:lnRef>
-          <a:fillRef idx="1">
-            <a:schemeClr val="accent1"/>
-          </a:fillRef>
-          <a:effectRef idx="0">
-            <a:schemeClr val="accent1"/>
-          </a:effectRef>
-          <a:fontRef idx="minor">
-            <a:schemeClr val="lt1"/>
-          </a:fontRef>
-        </p:style>
-        <p:txBody>
-          <a:bodyPr rtlCol="0" anchor="ctr"/>
-          <a:lstStyle/>
-          <a:p>
-            <a:pPr algn="ctr"/>
-            <a:endParaRPr lang="hu-HU" dirty="0"/>
-          </a:p>
-        </p:txBody>
-      </p:sp>
-      <p:sp>
-        <p:nvSpPr>
-          <p:cNvPr id="6" name="Szövegdoboz 5">
-            <a:extLst>
-              <a:ext uri="{FF2B5EF4-FFF2-40B4-BE49-F238E27FC236}">
-                <a16:creationId xmlns:a16="http://schemas.microsoft.com/office/drawing/2014/main" id="{5B6AC857-2A98-66B3-8AC9-33FBAB3EDDF5}"/>
-              </a:ext>
-            </a:extLst>
-          </p:cNvPr>
-          <p:cNvSpPr txBox="1"/>
-          <p:nvPr/>
-        </p:nvSpPr>
-        <p:spPr>
-          <a:xfrm>
-            <a:off x="1128030" y="1597693"/>
-            <a:ext cx="4095750" cy="2031325"/>
-          </a:xfrm>
-          <a:prstGeom prst="rect">
-            <a:avLst/>
-          </a:prstGeom>
-          <a:noFill/>
-        </p:spPr>
-        <p:txBody>
-          <a:bodyPr wrap="square" rtlCol="0">
-            <a:spAutoFit/>
-          </a:bodyPr>
-          <a:lstStyle/>
-          <a:p>
-            <a:pPr algn="just"/>
-            <a:r>
-              <a:rPr lang="en-US" b="1" i="0" dirty="0">
-                <a:solidFill>
-                  <a:srgbClr val="5019B3"/>
-                </a:solidFill>
-                <a:effectLst/>
-                <a:latin typeface="Rubik"/>
-              </a:rPr>
-              <a:t>In </a:t>
-            </a:r>
-            <a:r>
-              <a:rPr lang="en-US" b="1" i="0" dirty="0" err="1">
-                <a:solidFill>
-                  <a:srgbClr val="5019B3"/>
-                </a:solidFill>
-                <a:effectLst/>
-                <a:latin typeface="Rubik"/>
-              </a:rPr>
-              <a:t>Pygame</a:t>
-            </a:r>
-            <a:r>
-              <a:rPr lang="en-US" b="1" i="0" dirty="0">
-                <a:solidFill>
-                  <a:srgbClr val="5019B3"/>
-                </a:solidFill>
-                <a:effectLst/>
-                <a:latin typeface="Rubik"/>
-              </a:rPr>
-              <a:t>, a sprite is an object that represents a game element. It can be an image, animation, or any other visual element in a game. </a:t>
-            </a:r>
-            <a:r>
-              <a:rPr lang="en-US" b="1" i="0" dirty="0" err="1">
-                <a:solidFill>
-                  <a:srgbClr val="5019B3"/>
-                </a:solidFill>
-                <a:effectLst/>
-                <a:latin typeface="Rubik"/>
-              </a:rPr>
-              <a:t>Pygame</a:t>
-            </a:r>
-            <a:r>
-              <a:rPr lang="en-US" b="1" i="0" dirty="0">
-                <a:solidFill>
-                  <a:srgbClr val="5019B3"/>
-                </a:solidFill>
-                <a:effectLst/>
-                <a:latin typeface="Rubik"/>
-              </a:rPr>
-              <a:t> provides a Sprite class that you can use to create and manage sprites efficiently.</a:t>
-            </a:r>
-            <a:br>
-              <a:rPr lang="en-US" dirty="0"/>
-            </a:br>
-            <a:endParaRPr lang="hu-HU" dirty="0"/>
-          </a:p>
-        </p:txBody>
-      </p:sp>
-      <p:sp>
-        <p:nvSpPr>
-          <p:cNvPr id="7" name="Szövegdoboz 6">
-            <a:extLst>
-              <a:ext uri="{FF2B5EF4-FFF2-40B4-BE49-F238E27FC236}">
-                <a16:creationId xmlns:a16="http://schemas.microsoft.com/office/drawing/2014/main" id="{7819F685-963E-271F-BC1B-FDA54155C9CE}"/>
-              </a:ext>
-            </a:extLst>
-          </p:cNvPr>
-          <p:cNvSpPr txBox="1"/>
-          <p:nvPr/>
-        </p:nvSpPr>
-        <p:spPr>
-          <a:xfrm>
-            <a:off x="1647142" y="735919"/>
-            <a:ext cx="3057525" cy="861774"/>
-          </a:xfrm>
-          <a:prstGeom prst="rect">
-            <a:avLst/>
-          </a:prstGeom>
-          <a:noFill/>
-        </p:spPr>
-        <p:txBody>
-          <a:bodyPr wrap="square" rtlCol="0">
-            <a:spAutoFit/>
-          </a:bodyPr>
-          <a:lstStyle/>
-          <a:p>
-            <a:pPr algn="ctr"/>
-            <a:r>
-              <a:rPr lang="hu-HU" sz="3200" b="1" i="0" dirty="0">
-                <a:solidFill>
-                  <a:srgbClr val="5019B3"/>
-                </a:solidFill>
-                <a:effectLst/>
-                <a:latin typeface="Rubik"/>
-              </a:rPr>
-              <a:t>Mi is az a </a:t>
-            </a:r>
-            <a:r>
-              <a:rPr lang="hu-HU" sz="3200" b="1" i="0" dirty="0" err="1">
-                <a:solidFill>
-                  <a:srgbClr val="5019B3"/>
-                </a:solidFill>
-                <a:effectLst/>
-                <a:latin typeface="Rubik"/>
-              </a:rPr>
-              <a:t>sprite</a:t>
-            </a:r>
-            <a:r>
-              <a:rPr lang="hu-HU" sz="3200" b="1" i="0" dirty="0">
-                <a:solidFill>
-                  <a:srgbClr val="5019B3"/>
-                </a:solidFill>
-                <a:effectLst/>
-                <a:latin typeface="Rubik"/>
-              </a:rPr>
-              <a:t>?</a:t>
-            </a:r>
-          </a:p>
-          <a:p>
-            <a:endParaRPr lang="hu-HU" dirty="0"/>
-          </a:p>
-        </p:txBody>
-      </p:sp>
-      <p:sp>
-        <p:nvSpPr>
-          <p:cNvPr id="8" name="Téglalap: lekerekített 7">
-            <a:extLst>
-              <a:ext uri="{FF2B5EF4-FFF2-40B4-BE49-F238E27FC236}">
-                <a16:creationId xmlns:a16="http://schemas.microsoft.com/office/drawing/2014/main" id="{104486A8-B0E8-F708-7D72-B551D3E54053}"/>
-              </a:ext>
-            </a:extLst>
-          </p:cNvPr>
-          <p:cNvSpPr/>
-          <p:nvPr/>
-        </p:nvSpPr>
-        <p:spPr>
-          <a:xfrm>
-            <a:off x="6527687" y="3629018"/>
-            <a:ext cx="4784269" cy="2811242"/>
-          </a:xfrm>
-          <a:prstGeom prst="roundRect">
-            <a:avLst>
-              <a:gd name="adj" fmla="val 4094"/>
-            </a:avLst>
-          </a:prstGeom>
-          <a:solidFill>
-            <a:schemeClr val="bg1">
-              <a:alpha val="80000"/>
-            </a:schemeClr>
-          </a:solidFill>
-          <a:ln w="120650" cap="sq">
-            <a:noFill/>
-            <a:round/>
-          </a:ln>
-        </p:spPr>
-        <p:style>
-          <a:lnRef idx="2">
-            <a:schemeClr val="accent1">
-              <a:shade val="15000"/>
-            </a:schemeClr>
-          </a:lnRef>
-          <a:fillRef idx="1">
-            <a:schemeClr val="accent1"/>
-          </a:fillRef>
-          <a:effectRef idx="0">
-            <a:schemeClr val="accent1"/>
-          </a:effectRef>
-          <a:fontRef idx="minor">
-            <a:schemeClr val="lt1"/>
-          </a:fontRef>
-        </p:style>
-        <p:txBody>
-          <a:bodyPr rtlCol="0" anchor="ctr"/>
-          <a:lstStyle/>
-          <a:p>
-            <a:pPr algn="ctr"/>
-            <a:endParaRPr lang="hu-HU" dirty="0"/>
-          </a:p>
-        </p:txBody>
-      </p:sp>
-      <p:pic>
-        <p:nvPicPr>
-          <p:cNvPr id="1026" name="Picture 2">
-            <a:extLst>
-              <a:ext uri="{FF2B5EF4-FFF2-40B4-BE49-F238E27FC236}">
-                <a16:creationId xmlns:a16="http://schemas.microsoft.com/office/drawing/2014/main" id="{7A82368D-859C-5EE3-8D89-77E6D75EAD7D}"/>
-              </a:ext>
-            </a:extLst>
-          </p:cNvPr>
-          <p:cNvPicPr>
-            <a:picLocks noChangeAspect="1" noChangeArrowheads="1"/>
-          </p:cNvPicPr>
-          <p:nvPr/>
-        </p:nvPicPr>
-        <p:blipFill>
-          <a:blip r:embed="rId2">
-            <a:extLst>
-              <a:ext uri="{28A0092B-C50C-407E-A947-70E740481C1C}">
-                <a14:useLocalDpi xmlns:a14="http://schemas.microsoft.com/office/drawing/2010/main" val="0"/>
-              </a:ext>
-            </a:extLst>
-          </a:blip>
-          <a:srcRect/>
-          <a:stretch>
-            <a:fillRect/>
-          </a:stretch>
-        </p:blipFill>
-        <p:spPr bwMode="auto">
-          <a:xfrm>
-            <a:off x="6725670" y="1166806"/>
-            <a:ext cx="4388302" cy="1234210"/>
-          </a:xfrm>
-          <a:prstGeom prst="rect">
-            <a:avLst/>
-          </a:prstGeom>
-          <a:noFill/>
-          <a:extLst>
-            <a:ext uri="{909E8E84-426E-40DD-AFC4-6F175D3DCCD1}">
-              <a14:hiddenFill xmlns:a14="http://schemas.microsoft.com/office/drawing/2010/main">
-                <a:solidFill>
-                  <a:srgbClr val="FFFFFF"/>
-                </a:solidFill>
-              </a14:hiddenFill>
-            </a:ext>
-          </a:extLst>
-        </p:spPr>
-      </p:pic>
-    </p:spTree>
-    <p:extLst>
-      <p:ext uri="{BB962C8B-B14F-4D97-AF65-F5344CB8AC3E}">
-        <p14:creationId xmlns:p14="http://schemas.microsoft.com/office/powerpoint/2010/main" val="2433985320"/>
-      </p:ext>
-    </p:extLst>
-  </p:cSld>
-  <p:clrMapOvr>
-    <a:masterClrMapping/>
-  </p:clrMapOvr>
+  <p:transition spd="slow">
+    <p:push dir="u"/>
+  </p:transition>
+  <p:timing>
+    <p:tnLst>
+      <p:par>
+        <p:cTn id="1" dur="indefinite" restart="never" nodeType="tmRoot"/>
+      </p:par>
+    </p:tnLst>
+  </p:timing>
 </p:sld>
 </file>
 
@@ -6097,64 +6224,716 @@
       </p:grpSpPr>
       <p:sp>
         <p:nvSpPr>
-          <p:cNvPr id="2" name="Cím 1">
-            <a:extLst>
-              <a:ext uri="{FF2B5EF4-FFF2-40B4-BE49-F238E27FC236}">
-                <a16:creationId xmlns:a16="http://schemas.microsoft.com/office/drawing/2014/main" id="{D1CE9B8A-DB08-5227-4E90-0FE396A4D141}"/>
-              </a:ext>
-            </a:extLst>
-          </p:cNvPr>
-          <p:cNvSpPr>
-            <a:spLocks noGrp="1"/>
-          </p:cNvSpPr>
-          <p:nvPr>
-            <p:ph type="ctrTitle"/>
-          </p:nvPr>
-        </p:nvSpPr>
-        <p:spPr/>
-        <p:txBody>
-          <a:bodyPr/>
+          <p:cNvPr id="4" name="Ellipszis 3">
+            <a:extLst>
+              <a:ext uri="{FF2B5EF4-FFF2-40B4-BE49-F238E27FC236}">
+                <a16:creationId xmlns:a16="http://schemas.microsoft.com/office/drawing/2014/main" xmlns="" id="{5E590742-0F2F-708E-87FC-8CF5ABA75119}"/>
+              </a:ext>
+            </a:extLst>
+          </p:cNvPr>
+          <p:cNvSpPr/>
+          <p:nvPr/>
+        </p:nvSpPr>
+        <p:spPr>
+          <a:xfrm>
+            <a:off x="2803967" y="136967"/>
+            <a:ext cx="6584065" cy="6584065"/>
+          </a:xfrm>
+          <a:prstGeom prst="ellipse">
+            <a:avLst/>
+          </a:prstGeom>
+          <a:solidFill>
+            <a:srgbClr val="4B199F"/>
+          </a:solidFill>
+          <a:ln>
+            <a:noFill/>
+          </a:ln>
+          <a:effectLst>
+            <a:innerShdw blurRad="533400">
+              <a:prstClr val="black">
+                <a:alpha val="71000"/>
+              </a:prstClr>
+            </a:innerShdw>
+          </a:effectLst>
+        </p:spPr>
+        <p:style>
+          <a:lnRef idx="2">
+            <a:schemeClr val="accent1">
+              <a:shade val="15000"/>
+            </a:schemeClr>
+          </a:lnRef>
+          <a:fillRef idx="1">
+            <a:schemeClr val="accent1"/>
+          </a:fillRef>
+          <a:effectRef idx="0">
+            <a:schemeClr val="accent1"/>
+          </a:effectRef>
+          <a:fontRef idx="minor">
+            <a:schemeClr val="lt1"/>
+          </a:fontRef>
+        </p:style>
+        <p:txBody>
+          <a:bodyPr rtlCol="0" anchor="ctr"/>
           <a:lstStyle/>
           <a:p>
+            <a:pPr algn="ctr"/>
             <a:endParaRPr lang="hu-HU"/>
           </a:p>
         </p:txBody>
       </p:sp>
       <p:sp>
         <p:nvSpPr>
-          <p:cNvPr id="3" name="Alcím 2">
-            <a:extLst>
-              <a:ext uri="{FF2B5EF4-FFF2-40B4-BE49-F238E27FC236}">
-                <a16:creationId xmlns:a16="http://schemas.microsoft.com/office/drawing/2014/main" id="{33E051B4-6ACD-E318-EC79-47D89175A6C0}"/>
-              </a:ext>
-            </a:extLst>
-          </p:cNvPr>
-          <p:cNvSpPr>
-            <a:spLocks noGrp="1"/>
-          </p:cNvSpPr>
-          <p:nvPr>
-            <p:ph type="subTitle" idx="1"/>
-          </p:nvPr>
-        </p:nvSpPr>
-        <p:spPr/>
-        <p:txBody>
-          <a:bodyPr/>
+          <p:cNvPr id="5" name="Ellipszis 4">
+            <a:extLst>
+              <a:ext uri="{FF2B5EF4-FFF2-40B4-BE49-F238E27FC236}">
+                <a16:creationId xmlns:a16="http://schemas.microsoft.com/office/drawing/2014/main" xmlns="" id="{7BFA035C-0E90-EF99-09EB-F01F1787B99D}"/>
+              </a:ext>
+            </a:extLst>
+          </p:cNvPr>
+          <p:cNvSpPr/>
+          <p:nvPr/>
+        </p:nvSpPr>
+        <p:spPr>
+          <a:xfrm>
+            <a:off x="3530277" y="863277"/>
+            <a:ext cx="5131443" cy="5131443"/>
+          </a:xfrm>
+          <a:prstGeom prst="ellipse">
+            <a:avLst/>
+          </a:prstGeom>
+          <a:solidFill>
+            <a:srgbClr val="441887"/>
+          </a:solidFill>
+          <a:effectLst>
+            <a:innerShdw blurRad="368300">
+              <a:prstClr val="black">
+                <a:alpha val="41000"/>
+              </a:prstClr>
+            </a:innerShdw>
+          </a:effectLst>
+        </p:spPr>
+        <p:style>
+          <a:lnRef idx="2">
+            <a:schemeClr val="accent1">
+              <a:shade val="15000"/>
+            </a:schemeClr>
+          </a:lnRef>
+          <a:fillRef idx="1">
+            <a:schemeClr val="accent1"/>
+          </a:fillRef>
+          <a:effectRef idx="0">
+            <a:schemeClr val="accent1"/>
+          </a:effectRef>
+          <a:fontRef idx="minor">
+            <a:schemeClr val="lt1"/>
+          </a:fontRef>
+        </p:style>
+        <p:txBody>
+          <a:bodyPr rtlCol="0" anchor="ctr"/>
           <a:lstStyle/>
           <a:p>
+            <a:pPr algn="ctr"/>
             <a:endParaRPr lang="hu-HU"/>
+          </a:p>
+        </p:txBody>
+      </p:sp>
+      <p:sp>
+        <p:nvSpPr>
+          <p:cNvPr id="15" name="Szövegdoboz 14">
+            <a:extLst>
+              <a:ext uri="{FF2B5EF4-FFF2-40B4-BE49-F238E27FC236}">
+                <a16:creationId xmlns:a16="http://schemas.microsoft.com/office/drawing/2014/main" xmlns="" id="{BAD904EC-5503-CAE6-53A8-7648AE393A9D}"/>
+              </a:ext>
+            </a:extLst>
+          </p:cNvPr>
+          <p:cNvSpPr txBox="1"/>
+          <p:nvPr/>
+        </p:nvSpPr>
+        <p:spPr>
+          <a:xfrm>
+            <a:off x="4049861" y="2141397"/>
+            <a:ext cx="4396873" cy="1754326"/>
+          </a:xfrm>
+          <a:prstGeom prst="rect">
+            <a:avLst/>
+          </a:prstGeom>
+          <a:noFill/>
+          <a:effectLst>
+            <a:outerShdw sx="1000" sy="1000" algn="ctr" rotWithShape="0">
+              <a:srgbClr val="000000"/>
+            </a:outerShdw>
+          </a:effectLst>
+        </p:spPr>
+        <p:txBody>
+          <a:bodyPr wrap="square" rtlCol="0">
+            <a:spAutoFit/>
+          </a:bodyPr>
+          <a:lstStyle/>
+          <a:p>
+            <a:r>
+              <a:rPr lang="hu-HU" sz="5400" dirty="0" smtClean="0">
+                <a:solidFill>
+                  <a:schemeClr val="bg1"/>
+                </a:solidFill>
+                <a:effectLst>
+                  <a:outerShdw dist="38100" sx="101000" sy="101000" algn="l" rotWithShape="0">
+                    <a:prstClr val="black">
+                      <a:alpha val="10000"/>
+                    </a:prstClr>
+                  </a:outerShdw>
+                </a:effectLst>
+                <a:latin typeface="Segoe UI Black" panose="020B0A02040204020203" pitchFamily="34" charset="0"/>
+                <a:ea typeface="Segoe UI Black" panose="020B0A02040204020203" pitchFamily="34" charset="0"/>
+              </a:rPr>
+              <a:t>Köszönjük a figyelmet!</a:t>
+            </a:r>
+            <a:endParaRPr lang="hu-HU" sz="5400" dirty="0">
+              <a:solidFill>
+                <a:schemeClr val="bg1"/>
+              </a:solidFill>
+              <a:effectLst>
+                <a:outerShdw dist="38100" sx="101000" sy="101000" algn="l" rotWithShape="0">
+                  <a:prstClr val="black">
+                    <a:alpha val="10000"/>
+                  </a:prstClr>
+                </a:outerShdw>
+              </a:effectLst>
+              <a:latin typeface="Segoe UI Black" panose="020B0A02040204020203" pitchFamily="34" charset="0"/>
+              <a:ea typeface="Segoe UI Black" panose="020B0A02040204020203" pitchFamily="34" charset="0"/>
+            </a:endParaRPr>
+          </a:p>
+        </p:txBody>
+      </p:sp>
+      <p:sp>
+        <p:nvSpPr>
+          <p:cNvPr id="17" name="Szövegdoboz 15">
+            <a:extLst>
+              <a:ext uri="{FF2B5EF4-FFF2-40B4-BE49-F238E27FC236}">
+                <a16:creationId xmlns:a16="http://schemas.microsoft.com/office/drawing/2014/main" xmlns="" id="{C9117FAE-FE67-5743-F7DB-0D7FE2C64D91}"/>
+              </a:ext>
+            </a:extLst>
+          </p:cNvPr>
+          <p:cNvSpPr txBox="1"/>
+          <p:nvPr/>
+        </p:nvSpPr>
+        <p:spPr>
+          <a:xfrm>
+            <a:off x="3745262" y="4098842"/>
+            <a:ext cx="4701472" cy="646331"/>
+          </a:xfrm>
+          <a:prstGeom prst="rect">
+            <a:avLst/>
+          </a:prstGeom>
+          <a:noFill/>
+        </p:spPr>
+        <p:txBody>
+          <a:bodyPr wrap="square" rtlCol="0">
+            <a:spAutoFit/>
+          </a:bodyPr>
+          <a:lstStyle/>
+          <a:p>
+            <a:r>
+              <a:rPr lang="hu-HU" sz="1600" b="0" i="0" dirty="0" smtClean="0">
+                <a:solidFill>
+                  <a:srgbClr val="FFFFFF"/>
+                </a:solidFill>
+                <a:effectLst/>
+                <a:latin typeface="Barlow" panose="020F0502020204030204" pitchFamily="2" charset="-18"/>
+              </a:rPr>
+              <a:t>Készítette: </a:t>
+            </a:r>
+            <a:r>
+              <a:rPr lang="hu-HU" sz="1600" dirty="0">
+                <a:solidFill>
+                  <a:srgbClr val="FFFFFF"/>
+                </a:solidFill>
+                <a:latin typeface="Barlow" panose="020F0502020204030204" pitchFamily="2" charset="-18"/>
+              </a:rPr>
+              <a:t>Kállai </a:t>
+            </a:r>
+            <a:r>
+              <a:rPr lang="hu-HU" sz="1600" dirty="0" smtClean="0">
+                <a:solidFill>
+                  <a:srgbClr val="FFFFFF"/>
+                </a:solidFill>
+                <a:latin typeface="Barlow" panose="020F0502020204030204" pitchFamily="2" charset="-18"/>
+              </a:rPr>
+              <a:t>Gábor, </a:t>
+            </a:r>
+            <a:r>
+              <a:rPr lang="hu-HU" sz="1600" dirty="0">
+                <a:solidFill>
+                  <a:srgbClr val="FFFFFF"/>
+                </a:solidFill>
+                <a:latin typeface="Barlow" panose="020F0502020204030204" pitchFamily="2" charset="-18"/>
+              </a:rPr>
+              <a:t>Szalai </a:t>
+            </a:r>
+            <a:r>
+              <a:rPr lang="hu-HU" sz="1600" dirty="0" smtClean="0">
+                <a:solidFill>
+                  <a:srgbClr val="FFFFFF"/>
+                </a:solidFill>
+                <a:latin typeface="Barlow" panose="020F0502020204030204" pitchFamily="2" charset="-18"/>
+              </a:rPr>
+              <a:t>Bence, </a:t>
+            </a:r>
+            <a:r>
+              <a:rPr lang="hu-HU" sz="1600" dirty="0">
+                <a:solidFill>
+                  <a:srgbClr val="FFFFFF"/>
+                </a:solidFill>
+                <a:latin typeface="Barlow" panose="020F0502020204030204" pitchFamily="2" charset="-18"/>
+              </a:rPr>
+              <a:t>Bánhidai </a:t>
+            </a:r>
+            <a:r>
+              <a:rPr lang="hu-HU" sz="1600" dirty="0" smtClean="0">
+                <a:solidFill>
+                  <a:srgbClr val="FFFFFF"/>
+                </a:solidFill>
+                <a:latin typeface="Barlow" panose="020F0502020204030204" pitchFamily="2" charset="-18"/>
+              </a:rPr>
+              <a:t>Mátyás</a:t>
+            </a:r>
+            <a:endParaRPr lang="hu-HU" sz="1600" b="0" i="0" dirty="0" smtClean="0">
+              <a:solidFill>
+                <a:srgbClr val="FFFFFF"/>
+              </a:solidFill>
+              <a:effectLst/>
+              <a:latin typeface="Barlow" panose="020F0502020204030204" pitchFamily="2" charset="-18"/>
+            </a:endParaRPr>
+          </a:p>
+          <a:p>
+            <a:pPr algn="ctr"/>
+            <a:endParaRPr lang="hu-HU" sz="2000" dirty="0"/>
           </a:p>
         </p:txBody>
       </p:sp>
     </p:spTree>
     <p:extLst>
       <p:ext uri="{BB962C8B-B14F-4D97-AF65-F5344CB8AC3E}">
-        <p14:creationId xmlns:p14="http://schemas.microsoft.com/office/powerpoint/2010/main" val="605018872"/>
+        <p14:creationId xmlns:p14="http://schemas.microsoft.com/office/powerpoint/2010/main" val="2378275473"/>
       </p:ext>
     </p:extLst>
   </p:cSld>
   <p:clrMapOvr>
     <a:masterClrMapping/>
   </p:clrMapOvr>
+  <p:transition spd="slow">
+    <p:push dir="u"/>
+  </p:transition>
+  <p:timing>
+    <p:tnLst>
+      <p:par>
+        <p:cTn id="1" dur="indefinite" restart="never" nodeType="tmRoot">
+          <p:childTnLst>
+            <p:seq concurrent="1" nextAc="seek">
+              <p:cTn id="2" dur="indefinite" nodeType="mainSeq">
+                <p:childTnLst>
+                  <p:par>
+                    <p:cTn id="3" fill="hold">
+                      <p:stCondLst>
+                        <p:cond delay="indefinite"/>
+                        <p:cond evt="onBegin" delay="0">
+                          <p:tn val="2"/>
+                        </p:cond>
+                      </p:stCondLst>
+                      <p:childTnLst>
+                        <p:par>
+                          <p:cTn id="4" fill="hold">
+                            <p:stCondLst>
+                              <p:cond delay="0"/>
+                            </p:stCondLst>
+                            <p:childTnLst>
+                              <p:par>
+                                <p:cTn id="5" presetID="53" presetClass="entr" presetSubtype="16" fill="hold" grpId="0" nodeType="withEffect">
+                                  <p:stCondLst>
+                                    <p:cond delay="0"/>
+                                  </p:stCondLst>
+                                  <p:childTnLst>
+                                    <p:set>
+                                      <p:cBhvr>
+                                        <p:cTn id="6" dur="1" fill="hold">
+                                          <p:stCondLst>
+                                            <p:cond delay="0"/>
+                                          </p:stCondLst>
+                                        </p:cTn>
+                                        <p:tgtEl>
+                                          <p:spTgt spid="4"/>
+                                        </p:tgtEl>
+                                        <p:attrNameLst>
+                                          <p:attrName>style.visibility</p:attrName>
+                                        </p:attrNameLst>
+                                      </p:cBhvr>
+                                      <p:to>
+                                        <p:strVal val="visible"/>
+                                      </p:to>
+                                    </p:set>
+                                    <p:anim calcmode="lin" valueType="num">
+                                      <p:cBhvr>
+                                        <p:cTn id="7" dur="300" fill="hold"/>
+                                        <p:tgtEl>
+                                          <p:spTgt spid="4"/>
+                                        </p:tgtEl>
+                                        <p:attrNameLst>
+                                          <p:attrName>ppt_w</p:attrName>
+                                        </p:attrNameLst>
+                                      </p:cBhvr>
+                                      <p:tavLst>
+                                        <p:tav tm="0">
+                                          <p:val>
+                                            <p:fltVal val="0"/>
+                                          </p:val>
+                                        </p:tav>
+                                        <p:tav tm="100000">
+                                          <p:val>
+                                            <p:strVal val="#ppt_w"/>
+                                          </p:val>
+                                        </p:tav>
+                                      </p:tavLst>
+                                    </p:anim>
+                                    <p:anim calcmode="lin" valueType="num">
+                                      <p:cBhvr>
+                                        <p:cTn id="8" dur="300" fill="hold"/>
+                                        <p:tgtEl>
+                                          <p:spTgt spid="4"/>
+                                        </p:tgtEl>
+                                        <p:attrNameLst>
+                                          <p:attrName>ppt_h</p:attrName>
+                                        </p:attrNameLst>
+                                      </p:cBhvr>
+                                      <p:tavLst>
+                                        <p:tav tm="0">
+                                          <p:val>
+                                            <p:fltVal val="0"/>
+                                          </p:val>
+                                        </p:tav>
+                                        <p:tav tm="100000">
+                                          <p:val>
+                                            <p:strVal val="#ppt_h"/>
+                                          </p:val>
+                                        </p:tav>
+                                      </p:tavLst>
+                                    </p:anim>
+                                    <p:animEffect transition="in" filter="fade">
+                                      <p:cBhvr>
+                                        <p:cTn id="9" dur="300"/>
+                                        <p:tgtEl>
+                                          <p:spTgt spid="4"/>
+                                        </p:tgtEl>
+                                      </p:cBhvr>
+                                    </p:animEffect>
+                                  </p:childTnLst>
+                                </p:cTn>
+                              </p:par>
+                            </p:childTnLst>
+                          </p:cTn>
+                        </p:par>
+                        <p:par>
+                          <p:cTn id="10" fill="hold">
+                            <p:stCondLst>
+                              <p:cond delay="300"/>
+                            </p:stCondLst>
+                            <p:childTnLst>
+                              <p:par>
+                                <p:cTn id="11" presetID="53" presetClass="entr" presetSubtype="16" fill="hold" grpId="0" nodeType="afterEffect">
+                                  <p:stCondLst>
+                                    <p:cond delay="200"/>
+                                  </p:stCondLst>
+                                  <p:childTnLst>
+                                    <p:set>
+                                      <p:cBhvr>
+                                        <p:cTn id="12" dur="1" fill="hold">
+                                          <p:stCondLst>
+                                            <p:cond delay="0"/>
+                                          </p:stCondLst>
+                                        </p:cTn>
+                                        <p:tgtEl>
+                                          <p:spTgt spid="5"/>
+                                        </p:tgtEl>
+                                        <p:attrNameLst>
+                                          <p:attrName>style.visibility</p:attrName>
+                                        </p:attrNameLst>
+                                      </p:cBhvr>
+                                      <p:to>
+                                        <p:strVal val="visible"/>
+                                      </p:to>
+                                    </p:set>
+                                    <p:anim calcmode="lin" valueType="num">
+                                      <p:cBhvr>
+                                        <p:cTn id="13" dur="300" fill="hold"/>
+                                        <p:tgtEl>
+                                          <p:spTgt spid="5"/>
+                                        </p:tgtEl>
+                                        <p:attrNameLst>
+                                          <p:attrName>ppt_w</p:attrName>
+                                        </p:attrNameLst>
+                                      </p:cBhvr>
+                                      <p:tavLst>
+                                        <p:tav tm="0">
+                                          <p:val>
+                                            <p:fltVal val="0"/>
+                                          </p:val>
+                                        </p:tav>
+                                        <p:tav tm="100000">
+                                          <p:val>
+                                            <p:strVal val="#ppt_w"/>
+                                          </p:val>
+                                        </p:tav>
+                                      </p:tavLst>
+                                    </p:anim>
+                                    <p:anim calcmode="lin" valueType="num">
+                                      <p:cBhvr>
+                                        <p:cTn id="14" dur="300" fill="hold"/>
+                                        <p:tgtEl>
+                                          <p:spTgt spid="5"/>
+                                        </p:tgtEl>
+                                        <p:attrNameLst>
+                                          <p:attrName>ppt_h</p:attrName>
+                                        </p:attrNameLst>
+                                      </p:cBhvr>
+                                      <p:tavLst>
+                                        <p:tav tm="0">
+                                          <p:val>
+                                            <p:fltVal val="0"/>
+                                          </p:val>
+                                        </p:tav>
+                                        <p:tav tm="100000">
+                                          <p:val>
+                                            <p:strVal val="#ppt_h"/>
+                                          </p:val>
+                                        </p:tav>
+                                      </p:tavLst>
+                                    </p:anim>
+                                    <p:animEffect transition="in" filter="fade">
+                                      <p:cBhvr>
+                                        <p:cTn id="15" dur="300"/>
+                                        <p:tgtEl>
+                                          <p:spTgt spid="5"/>
+                                        </p:tgtEl>
+                                      </p:cBhvr>
+                                    </p:animEffect>
+                                  </p:childTnLst>
+                                </p:cTn>
+                              </p:par>
+                            </p:childTnLst>
+                          </p:cTn>
+                        </p:par>
+                        <p:par>
+                          <p:cTn id="16" fill="hold">
+                            <p:stCondLst>
+                              <p:cond delay="800"/>
+                            </p:stCondLst>
+                            <p:childTnLst>
+                              <p:par>
+                                <p:cTn id="17" presetID="2" presetClass="entr" presetSubtype="4" fill="hold" nodeType="afterEffect">
+                                  <p:stCondLst>
+                                    <p:cond delay="500"/>
+                                  </p:stCondLst>
+                                  <p:childTnLst>
+                                    <p:set>
+                                      <p:cBhvr>
+                                        <p:cTn id="18" dur="1" fill="hold">
+                                          <p:stCondLst>
+                                            <p:cond delay="0"/>
+                                          </p:stCondLst>
+                                        </p:cTn>
+                                        <p:tgtEl>
+                                          <p:spTgt spid="15">
+                                            <p:txEl>
+                                              <p:pRg st="0" end="0"/>
+                                            </p:txEl>
+                                          </p:spTgt>
+                                        </p:tgtEl>
+                                        <p:attrNameLst>
+                                          <p:attrName>style.visibility</p:attrName>
+                                        </p:attrNameLst>
+                                      </p:cBhvr>
+                                      <p:to>
+                                        <p:strVal val="visible"/>
+                                      </p:to>
+                                    </p:set>
+                                    <p:anim calcmode="lin" valueType="num">
+                                      <p:cBhvr additive="base">
+                                        <p:cTn id="19" dur="1300" fill="hold"/>
+                                        <p:tgtEl>
+                                          <p:spTgt spid="15">
+                                            <p:txEl>
+                                              <p:pRg st="0" end="0"/>
+                                            </p:txEl>
+                                          </p:spTgt>
+                                        </p:tgtEl>
+                                        <p:attrNameLst>
+                                          <p:attrName>ppt_x</p:attrName>
+                                        </p:attrNameLst>
+                                      </p:cBhvr>
+                                      <p:tavLst>
+                                        <p:tav tm="0">
+                                          <p:val>
+                                            <p:strVal val="#ppt_x"/>
+                                          </p:val>
+                                        </p:tav>
+                                        <p:tav tm="100000">
+                                          <p:val>
+                                            <p:strVal val="#ppt_x"/>
+                                          </p:val>
+                                        </p:tav>
+                                      </p:tavLst>
+                                    </p:anim>
+                                    <p:anim calcmode="lin" valueType="num">
+                                      <p:cBhvr additive="base">
+                                        <p:cTn id="20" dur="1300" fill="hold"/>
+                                        <p:tgtEl>
+                                          <p:spTgt spid="15">
+                                            <p:txEl>
+                                              <p:pRg st="0" end="0"/>
+                                            </p:txEl>
+                                          </p:spTgt>
+                                        </p:tgtEl>
+                                        <p:attrNameLst>
+                                          <p:attrName>ppt_y</p:attrName>
+                                        </p:attrNameLst>
+                                      </p:cBhvr>
+                                      <p:tavLst>
+                                        <p:tav tm="0">
+                                          <p:val>
+                                            <p:strVal val="1+#ppt_h/2"/>
+                                          </p:val>
+                                        </p:tav>
+                                        <p:tav tm="100000">
+                                          <p:val>
+                                            <p:strVal val="#ppt_y"/>
+                                          </p:val>
+                                        </p:tav>
+                                      </p:tavLst>
+                                    </p:anim>
+                                  </p:childTnLst>
+                                </p:cTn>
+                              </p:par>
+                            </p:childTnLst>
+                          </p:cTn>
+                        </p:par>
+                        <p:par>
+                          <p:cTn id="21" fill="hold">
+                            <p:stCondLst>
+                              <p:cond delay="2600"/>
+                            </p:stCondLst>
+                            <p:childTnLst>
+                              <p:par>
+                                <p:cTn id="22" presetID="42" presetClass="entr" presetSubtype="0" fill="hold" grpId="0" nodeType="afterEffect">
+                                  <p:stCondLst>
+                                    <p:cond delay="0"/>
+                                  </p:stCondLst>
+                                  <p:childTnLst>
+                                    <p:set>
+                                      <p:cBhvr>
+                                        <p:cTn id="23" dur="1" fill="hold">
+                                          <p:stCondLst>
+                                            <p:cond delay="0"/>
+                                          </p:stCondLst>
+                                        </p:cTn>
+                                        <p:tgtEl>
+                                          <p:spTgt spid="17"/>
+                                        </p:tgtEl>
+                                        <p:attrNameLst>
+                                          <p:attrName>style.visibility</p:attrName>
+                                        </p:attrNameLst>
+                                      </p:cBhvr>
+                                      <p:to>
+                                        <p:strVal val="visible"/>
+                                      </p:to>
+                                    </p:set>
+                                    <p:animEffect transition="in" filter="fade">
+                                      <p:cBhvr>
+                                        <p:cTn id="24" dur="1000"/>
+                                        <p:tgtEl>
+                                          <p:spTgt spid="17"/>
+                                        </p:tgtEl>
+                                      </p:cBhvr>
+                                    </p:animEffect>
+                                    <p:anim calcmode="lin" valueType="num">
+                                      <p:cBhvr>
+                                        <p:cTn id="25" dur="1000" fill="hold"/>
+                                        <p:tgtEl>
+                                          <p:spTgt spid="17"/>
+                                        </p:tgtEl>
+                                        <p:attrNameLst>
+                                          <p:attrName>ppt_x</p:attrName>
+                                        </p:attrNameLst>
+                                      </p:cBhvr>
+                                      <p:tavLst>
+                                        <p:tav tm="0">
+                                          <p:val>
+                                            <p:strVal val="#ppt_x"/>
+                                          </p:val>
+                                        </p:tav>
+                                        <p:tav tm="100000">
+                                          <p:val>
+                                            <p:strVal val="#ppt_x"/>
+                                          </p:val>
+                                        </p:tav>
+                                      </p:tavLst>
+                                    </p:anim>
+                                    <p:anim calcmode="lin" valueType="num">
+                                      <p:cBhvr>
+                                        <p:cTn id="26" dur="1000" fill="hold"/>
+                                        <p:tgtEl>
+                                          <p:spTgt spid="17"/>
+                                        </p:tgtEl>
+                                        <p:attrNameLst>
+                                          <p:attrName>ppt_y</p:attrName>
+                                        </p:attrNameLst>
+                                      </p:cBhvr>
+                                      <p:tavLst>
+                                        <p:tav tm="0">
+                                          <p:val>
+                                            <p:strVal val="#ppt_y+.1"/>
+                                          </p:val>
+                                        </p:tav>
+                                        <p:tav tm="100000">
+                                          <p:val>
+                                            <p:strVal val="#ppt_y"/>
+                                          </p:val>
+                                        </p:tav>
+                                      </p:tavLst>
+                                    </p:anim>
+                                  </p:childTnLst>
+                                </p:cTn>
+                              </p:par>
+                            </p:childTnLst>
+                          </p:cTn>
+                        </p:par>
+                      </p:childTnLst>
+                    </p:cTn>
+                  </p:par>
+                </p:childTnLst>
+              </p:cTn>
+              <p:prevCondLst>
+                <p:cond evt="onPrev" delay="0">
+                  <p:tgtEl>
+                    <p:sldTgt/>
+                  </p:tgtEl>
+                </p:cond>
+              </p:prevCondLst>
+              <p:nextCondLst>
+                <p:cond evt="onNext" delay="0">
+                  <p:tgtEl>
+                    <p:sldTgt/>
+                  </p:tgtEl>
+                </p:cond>
+              </p:nextCondLst>
+            </p:seq>
+          </p:childTnLst>
+        </p:cTn>
+      </p:par>
+    </p:tnLst>
+    <p:bldLst>
+      <p:bldP spid="4" grpId="0" animBg="1"/>
+      <p:bldP spid="5" grpId="0" animBg="1"/>
+      <p:bldP spid="17" grpId="0"/>
+    </p:bldLst>
+  </p:timing>
 </p:sld>
 </file>
 

</xml_diff>